<commit_message>
Revised ppt, modified half adder now it will work.
</commit_message>
<xml_diff>
--- a/DominoesPoster.pptx
+++ b/DominoesPoster.pptx
@@ -10,14 +10,14 @@
   <p:sldIdLst>
     <p:sldId id="258" r:id="rId2"/>
   </p:sldIdLst>
-  <p:sldSz cx="10058400" cy="7772400"/>
+  <p:sldSz cx="43891200" cy="32918400"/>
   <p:notesSz cx="6858000" cy="9144000"/>
   <p:defaultTextStyle>
     <a:defPPr>
       <a:defRPr lang="en-US"/>
     </a:defPPr>
-    <a:lvl1pPr marL="0" algn="l" defTabSz="509352" rtl="0" eaLnBrk="1" latinLnBrk="0" hangingPunct="1">
-      <a:defRPr sz="2000" kern="1200">
+    <a:lvl1pPr marL="0" algn="l" defTabSz="2194085" rtl="0" eaLnBrk="1" latinLnBrk="0" hangingPunct="1">
+      <a:defRPr sz="8615" kern="1200">
         <a:solidFill>
           <a:schemeClr val="tx1"/>
         </a:solidFill>
@@ -26,8 +26,8 @@
         <a:cs typeface="+mn-cs"/>
       </a:defRPr>
     </a:lvl1pPr>
-    <a:lvl2pPr marL="509352" algn="l" defTabSz="509352" rtl="0" eaLnBrk="1" latinLnBrk="0" hangingPunct="1">
-      <a:defRPr sz="2000" kern="1200">
+    <a:lvl2pPr marL="2194085" algn="l" defTabSz="2194085" rtl="0" eaLnBrk="1" latinLnBrk="0" hangingPunct="1">
+      <a:defRPr sz="8615" kern="1200">
         <a:solidFill>
           <a:schemeClr val="tx1"/>
         </a:solidFill>
@@ -36,8 +36,8 @@
         <a:cs typeface="+mn-cs"/>
       </a:defRPr>
     </a:lvl2pPr>
-    <a:lvl3pPr marL="1018705" algn="l" defTabSz="509352" rtl="0" eaLnBrk="1" latinLnBrk="0" hangingPunct="1">
-      <a:defRPr sz="2000" kern="1200">
+    <a:lvl3pPr marL="4388174" algn="l" defTabSz="2194085" rtl="0" eaLnBrk="1" latinLnBrk="0" hangingPunct="1">
+      <a:defRPr sz="8615" kern="1200">
         <a:solidFill>
           <a:schemeClr val="tx1"/>
         </a:solidFill>
@@ -46,8 +46,8 @@
         <a:cs typeface="+mn-cs"/>
       </a:defRPr>
     </a:lvl3pPr>
-    <a:lvl4pPr marL="1528058" algn="l" defTabSz="509352" rtl="0" eaLnBrk="1" latinLnBrk="0" hangingPunct="1">
-      <a:defRPr sz="2000" kern="1200">
+    <a:lvl4pPr marL="6582263" algn="l" defTabSz="2194085" rtl="0" eaLnBrk="1" latinLnBrk="0" hangingPunct="1">
+      <a:defRPr sz="8615" kern="1200">
         <a:solidFill>
           <a:schemeClr val="tx1"/>
         </a:solidFill>
@@ -56,8 +56,8 @@
         <a:cs typeface="+mn-cs"/>
       </a:defRPr>
     </a:lvl4pPr>
-    <a:lvl5pPr marL="2037411" algn="l" defTabSz="509352" rtl="0" eaLnBrk="1" latinLnBrk="0" hangingPunct="1">
-      <a:defRPr sz="2000" kern="1200">
+    <a:lvl5pPr marL="8776352" algn="l" defTabSz="2194085" rtl="0" eaLnBrk="1" latinLnBrk="0" hangingPunct="1">
+      <a:defRPr sz="8615" kern="1200">
         <a:solidFill>
           <a:schemeClr val="tx1"/>
         </a:solidFill>
@@ -66,8 +66,8 @@
         <a:cs typeface="+mn-cs"/>
       </a:defRPr>
     </a:lvl5pPr>
-    <a:lvl6pPr marL="2546764" algn="l" defTabSz="509352" rtl="0" eaLnBrk="1" latinLnBrk="0" hangingPunct="1">
-      <a:defRPr sz="2000" kern="1200">
+    <a:lvl6pPr marL="10970441" algn="l" defTabSz="2194085" rtl="0" eaLnBrk="1" latinLnBrk="0" hangingPunct="1">
+      <a:defRPr sz="8615" kern="1200">
         <a:solidFill>
           <a:schemeClr val="tx1"/>
         </a:solidFill>
@@ -76,8 +76,8 @@
         <a:cs typeface="+mn-cs"/>
       </a:defRPr>
     </a:lvl6pPr>
-    <a:lvl7pPr marL="3056116" algn="l" defTabSz="509352" rtl="0" eaLnBrk="1" latinLnBrk="0" hangingPunct="1">
-      <a:defRPr sz="2000" kern="1200">
+    <a:lvl7pPr marL="13164525" algn="l" defTabSz="2194085" rtl="0" eaLnBrk="1" latinLnBrk="0" hangingPunct="1">
+      <a:defRPr sz="8615" kern="1200">
         <a:solidFill>
           <a:schemeClr val="tx1"/>
         </a:solidFill>
@@ -86,8 +86,8 @@
         <a:cs typeface="+mn-cs"/>
       </a:defRPr>
     </a:lvl7pPr>
-    <a:lvl8pPr marL="3565469" algn="l" defTabSz="509352" rtl="0" eaLnBrk="1" latinLnBrk="0" hangingPunct="1">
-      <a:defRPr sz="2000" kern="1200">
+    <a:lvl8pPr marL="15358614" algn="l" defTabSz="2194085" rtl="0" eaLnBrk="1" latinLnBrk="0" hangingPunct="1">
+      <a:defRPr sz="8615" kern="1200">
         <a:solidFill>
           <a:schemeClr val="tx1"/>
         </a:solidFill>
@@ -96,8 +96,8 @@
         <a:cs typeface="+mn-cs"/>
       </a:defRPr>
     </a:lvl8pPr>
-    <a:lvl9pPr marL="4074821" algn="l" defTabSz="509352" rtl="0" eaLnBrk="1" latinLnBrk="0" hangingPunct="1">
-      <a:defRPr sz="2000" kern="1200">
+    <a:lvl9pPr marL="17552699" algn="l" defTabSz="2194085" rtl="0" eaLnBrk="1" latinLnBrk="0" hangingPunct="1">
+      <a:defRPr sz="8615" kern="1200">
         <a:solidFill>
           <a:schemeClr val="tx1"/>
         </a:solidFill>
@@ -110,42 +110,42 @@
   <p:extLst>
     <p:ext uri="{EFAFB233-063F-42B5-8137-9DF3F51BA10A}">
       <p15:sldGuideLst xmlns:p15="http://schemas.microsoft.com/office/powerpoint/2012/main">
-        <p15:guide id="1" orient="horz" pos="140">
+        <p15:guide id="1" orient="horz" pos="593" userDrawn="1">
           <p15:clr>
             <a:srgbClr val="A4A3A4"/>
           </p15:clr>
         </p15:guide>
-        <p15:guide id="2" orient="horz" pos="4748">
+        <p15:guide id="2" orient="horz" pos="20109" userDrawn="1">
           <p15:clr>
             <a:srgbClr val="A4A3A4"/>
           </p15:clr>
         </p15:guide>
-        <p15:guide id="3" pos="127">
+        <p15:guide id="3" pos="554" userDrawn="1">
           <p15:clr>
             <a:srgbClr val="A4A3A4"/>
           </p15:clr>
         </p15:guide>
-        <p15:guide id="4" pos="6188">
+        <p15:guide id="4" pos="27002" userDrawn="1">
           <p15:clr>
             <a:srgbClr val="A4A3A4"/>
           </p15:clr>
         </p15:guide>
-        <p15:guide id="5" pos="1963">
+        <p15:guide id="5" pos="8566" userDrawn="1">
           <p15:clr>
             <a:srgbClr val="A4A3A4"/>
           </p15:clr>
         </p15:guide>
-        <p15:guide id="6" pos="2087">
+        <p15:guide id="6" pos="9107" userDrawn="1">
           <p15:clr>
             <a:srgbClr val="A4A3A4"/>
           </p15:clr>
         </p15:guide>
-        <p15:guide id="7" pos="4364">
+        <p15:guide id="7" pos="19043" userDrawn="1">
           <p15:clr>
             <a:srgbClr val="A4A3A4"/>
           </p15:clr>
         </p15:guide>
-        <p15:guide id="8" pos="4224">
+        <p15:guide id="8" pos="18432" userDrawn="1">
           <p15:clr>
             <a:srgbClr val="A4A3A4"/>
           </p15:clr>
@@ -238,7 +238,7 @@
           <a:p>
             <a:fld id="{4B203E5C-FFFA-8D45-995D-91B8A0E2943A}" type="datetimeFigureOut">
               <a:rPr lang="en-US" smtClean="0"/>
-              <a:t>10/5/2016</a:t>
+              <a:t>10/6/2016</a:t>
             </a:fld>
             <a:endParaRPr lang="en-US"/>
           </a:p>
@@ -256,8 +256,8 @@
         </p:nvSpPr>
         <p:spPr>
           <a:xfrm>
-            <a:off x="1209675" y="685800"/>
-            <a:ext cx="4438650" cy="3429000"/>
+            <a:off x="1143000" y="685800"/>
+            <a:ext cx="4572000" cy="3429000"/>
           </a:xfrm>
           <a:prstGeom prst="rect">
             <a:avLst/>
@@ -411,8 +411,8 @@
   </p:cSld>
   <p:clrMap bg1="lt1" tx1="dk1" bg2="lt2" tx2="dk2" accent1="accent1" accent2="accent2" accent3="accent3" accent4="accent4" accent5="accent5" accent6="accent6" hlink="hlink" folHlink="folHlink"/>
   <p:notesStyle>
-    <a:lvl1pPr marL="0" algn="l" defTabSz="509352" rtl="0" eaLnBrk="1" latinLnBrk="0" hangingPunct="1">
-      <a:defRPr sz="1300" kern="1200">
+    <a:lvl1pPr marL="0" algn="l" defTabSz="2194085" rtl="0" eaLnBrk="1" latinLnBrk="0" hangingPunct="1">
+      <a:defRPr sz="5600" kern="1200">
         <a:solidFill>
           <a:schemeClr val="tx1"/>
         </a:solidFill>
@@ -421,8 +421,8 @@
         <a:cs typeface="+mn-cs"/>
       </a:defRPr>
     </a:lvl1pPr>
-    <a:lvl2pPr marL="509352" algn="l" defTabSz="509352" rtl="0" eaLnBrk="1" latinLnBrk="0" hangingPunct="1">
-      <a:defRPr sz="1300" kern="1200">
+    <a:lvl2pPr marL="2194085" algn="l" defTabSz="2194085" rtl="0" eaLnBrk="1" latinLnBrk="0" hangingPunct="1">
+      <a:defRPr sz="5600" kern="1200">
         <a:solidFill>
           <a:schemeClr val="tx1"/>
         </a:solidFill>
@@ -431,8 +431,8 @@
         <a:cs typeface="+mn-cs"/>
       </a:defRPr>
     </a:lvl2pPr>
-    <a:lvl3pPr marL="1018705" algn="l" defTabSz="509352" rtl="0" eaLnBrk="1" latinLnBrk="0" hangingPunct="1">
-      <a:defRPr sz="1300" kern="1200">
+    <a:lvl3pPr marL="4388174" algn="l" defTabSz="2194085" rtl="0" eaLnBrk="1" latinLnBrk="0" hangingPunct="1">
+      <a:defRPr sz="5600" kern="1200">
         <a:solidFill>
           <a:schemeClr val="tx1"/>
         </a:solidFill>
@@ -441,8 +441,8 @@
         <a:cs typeface="+mn-cs"/>
       </a:defRPr>
     </a:lvl3pPr>
-    <a:lvl4pPr marL="1528058" algn="l" defTabSz="509352" rtl="0" eaLnBrk="1" latinLnBrk="0" hangingPunct="1">
-      <a:defRPr sz="1300" kern="1200">
+    <a:lvl4pPr marL="6582263" algn="l" defTabSz="2194085" rtl="0" eaLnBrk="1" latinLnBrk="0" hangingPunct="1">
+      <a:defRPr sz="5600" kern="1200">
         <a:solidFill>
           <a:schemeClr val="tx1"/>
         </a:solidFill>
@@ -451,8 +451,8 @@
         <a:cs typeface="+mn-cs"/>
       </a:defRPr>
     </a:lvl4pPr>
-    <a:lvl5pPr marL="2037411" algn="l" defTabSz="509352" rtl="0" eaLnBrk="1" latinLnBrk="0" hangingPunct="1">
-      <a:defRPr sz="1300" kern="1200">
+    <a:lvl5pPr marL="8776352" algn="l" defTabSz="2194085" rtl="0" eaLnBrk="1" latinLnBrk="0" hangingPunct="1">
+      <a:defRPr sz="5600" kern="1200">
         <a:solidFill>
           <a:schemeClr val="tx1"/>
         </a:solidFill>
@@ -461,8 +461,8 @@
         <a:cs typeface="+mn-cs"/>
       </a:defRPr>
     </a:lvl5pPr>
-    <a:lvl6pPr marL="2546764" algn="l" defTabSz="509352" rtl="0" eaLnBrk="1" latinLnBrk="0" hangingPunct="1">
-      <a:defRPr sz="1300" kern="1200">
+    <a:lvl6pPr marL="10970441" algn="l" defTabSz="2194085" rtl="0" eaLnBrk="1" latinLnBrk="0" hangingPunct="1">
+      <a:defRPr sz="5600" kern="1200">
         <a:solidFill>
           <a:schemeClr val="tx1"/>
         </a:solidFill>
@@ -471,8 +471,8 @@
         <a:cs typeface="+mn-cs"/>
       </a:defRPr>
     </a:lvl6pPr>
-    <a:lvl7pPr marL="3056116" algn="l" defTabSz="509352" rtl="0" eaLnBrk="1" latinLnBrk="0" hangingPunct="1">
-      <a:defRPr sz="1300" kern="1200">
+    <a:lvl7pPr marL="13164525" algn="l" defTabSz="2194085" rtl="0" eaLnBrk="1" latinLnBrk="0" hangingPunct="1">
+      <a:defRPr sz="5600" kern="1200">
         <a:solidFill>
           <a:schemeClr val="tx1"/>
         </a:solidFill>
@@ -481,8 +481,8 @@
         <a:cs typeface="+mn-cs"/>
       </a:defRPr>
     </a:lvl7pPr>
-    <a:lvl8pPr marL="3565469" algn="l" defTabSz="509352" rtl="0" eaLnBrk="1" latinLnBrk="0" hangingPunct="1">
-      <a:defRPr sz="1300" kern="1200">
+    <a:lvl8pPr marL="15358614" algn="l" defTabSz="2194085" rtl="0" eaLnBrk="1" latinLnBrk="0" hangingPunct="1">
+      <a:defRPr sz="5600" kern="1200">
         <a:solidFill>
           <a:schemeClr val="tx1"/>
         </a:solidFill>
@@ -491,8 +491,8 @@
         <a:cs typeface="+mn-cs"/>
       </a:defRPr>
     </a:lvl8pPr>
-    <a:lvl9pPr marL="4074821" algn="l" defTabSz="509352" rtl="0" eaLnBrk="1" latinLnBrk="0" hangingPunct="1">
-      <a:defRPr sz="1300" kern="1200">
+    <a:lvl9pPr marL="17552699" algn="l" defTabSz="2194085" rtl="0" eaLnBrk="1" latinLnBrk="0" hangingPunct="1">
+      <a:defRPr sz="5600" kern="1200">
         <a:solidFill>
           <a:schemeClr val="tx1"/>
         </a:solidFill>
@@ -534,8 +534,8 @@
         </p:nvSpPr>
         <p:spPr>
           <a:xfrm>
-            <a:off x="3525519" y="2100612"/>
-            <a:ext cx="6138026" cy="3749470"/>
+            <a:off x="15384083" y="8896710"/>
+            <a:ext cx="26784113" cy="15880108"/>
           </a:xfrm>
           <a:ln>
             <a:noFill/>
@@ -548,7 +548,7 @@
           <a:lstStyle>
             <a:lvl1pPr marL="0" indent="0" algn="l">
               <a:buNone/>
-              <a:defRPr sz="1000" b="0" i="0">
+              <a:defRPr sz="4235" b="0" i="0">
                 <a:solidFill>
                   <a:schemeClr val="tx1"/>
                 </a:solidFill>
@@ -556,7 +556,7 @@
                 <a:cs typeface="LeituraSans-Grot 2"/>
               </a:defRPr>
             </a:lvl1pPr>
-            <a:lvl2pPr marL="509352" indent="0" algn="ctr">
+            <a:lvl2pPr marL="2157259" indent="0" algn="ctr">
               <a:buNone/>
               <a:defRPr>
                 <a:solidFill>
@@ -566,7 +566,7 @@
                 </a:solidFill>
               </a:defRPr>
             </a:lvl2pPr>
-            <a:lvl3pPr marL="1018705" indent="0" algn="ctr">
+            <a:lvl3pPr marL="4314521" indent="0" algn="ctr">
               <a:buNone/>
               <a:defRPr>
                 <a:solidFill>
@@ -576,7 +576,7 @@
                 </a:solidFill>
               </a:defRPr>
             </a:lvl3pPr>
-            <a:lvl4pPr marL="1528058" indent="0" algn="ctr">
+            <a:lvl4pPr marL="6471784" indent="0" algn="ctr">
               <a:buNone/>
               <a:defRPr>
                 <a:solidFill>
@@ -586,7 +586,7 @@
                 </a:solidFill>
               </a:defRPr>
             </a:lvl4pPr>
-            <a:lvl5pPr marL="2037411" indent="0" algn="ctr">
+            <a:lvl5pPr marL="8629047" indent="0" algn="ctr">
               <a:buNone/>
               <a:defRPr>
                 <a:solidFill>
@@ -596,7 +596,7 @@
                 </a:solidFill>
               </a:defRPr>
             </a:lvl5pPr>
-            <a:lvl6pPr marL="2546764" indent="0" algn="ctr">
+            <a:lvl6pPr marL="10786310" indent="0" algn="ctr">
               <a:buNone/>
               <a:defRPr>
                 <a:solidFill>
@@ -606,7 +606,7 @@
                 </a:solidFill>
               </a:defRPr>
             </a:lvl6pPr>
-            <a:lvl7pPr marL="3056116" indent="0" algn="ctr">
+            <a:lvl7pPr marL="12943568" indent="0" algn="ctr">
               <a:buNone/>
               <a:defRPr>
                 <a:solidFill>
@@ -616,7 +616,7 @@
                 </a:solidFill>
               </a:defRPr>
             </a:lvl7pPr>
-            <a:lvl8pPr marL="3565469" indent="0" algn="ctr">
+            <a:lvl8pPr marL="15100831" indent="0" algn="ctr">
               <a:buNone/>
               <a:defRPr>
                 <a:solidFill>
@@ -626,7 +626,7 @@
                 </a:solidFill>
               </a:defRPr>
             </a:lvl8pPr>
-            <a:lvl9pPr marL="4074821" indent="0" algn="ctr">
+            <a:lvl9pPr marL="17258089" indent="0" algn="ctr">
               <a:buNone/>
               <a:defRPr>
                 <a:solidFill>
@@ -657,8 +657,8 @@
         </p:nvSpPr>
         <p:spPr>
           <a:xfrm>
-            <a:off x="393701" y="2100612"/>
-            <a:ext cx="2722562" cy="5436837"/>
+            <a:off x="1717968" y="8896712"/>
+            <a:ext cx="11880271" cy="23026604"/>
           </a:xfrm>
         </p:spPr>
         <p:txBody>
@@ -672,7 +672,7 @@
               </a:spcBef>
               <a:buFontTx/>
               <a:buNone/>
-              <a:defRPr sz="1000" baseline="0">
+              <a:defRPr sz="4235" baseline="0">
                 <a:latin typeface="LeituraSans-Grot 1"/>
               </a:defRPr>
             </a:lvl1pPr>
@@ -682,7 +682,7 @@
               </a:spcBef>
               <a:buFontTx/>
               <a:buNone/>
-              <a:defRPr sz="1000" baseline="0">
+              <a:defRPr sz="4235" baseline="0">
                 <a:latin typeface="LeituraSans-Grot 1"/>
               </a:defRPr>
             </a:lvl2pPr>
@@ -692,7 +692,7 @@
               </a:spcBef>
               <a:buFontTx/>
               <a:buNone/>
-              <a:defRPr sz="1000" baseline="0">
+              <a:defRPr sz="4235" baseline="0">
                 <a:latin typeface="LeituraSans-Grot 1"/>
               </a:defRPr>
             </a:lvl3pPr>
@@ -702,7 +702,7 @@
               </a:spcBef>
               <a:buFontTx/>
               <a:buNone/>
-              <a:defRPr sz="1000" baseline="0">
+              <a:defRPr sz="4235" baseline="0">
                 <a:latin typeface="LeituraSans-Grot 1"/>
               </a:defRPr>
             </a:lvl4pPr>
@@ -712,7 +712,7 @@
               </a:spcBef>
               <a:buFontTx/>
               <a:buNone/>
-              <a:defRPr sz="1000" baseline="0">
+              <a:defRPr sz="4235" baseline="0">
                 <a:latin typeface="LeituraSans-Grot 1"/>
               </a:defRPr>
             </a:lvl5pPr>
@@ -742,8 +742,8 @@
         </p:blipFill>
         <p:spPr>
           <a:xfrm>
-            <a:off x="50240" y="20606"/>
-            <a:ext cx="3784665" cy="2009670"/>
+            <a:off x="219231" y="87272"/>
+            <a:ext cx="16514902" cy="8511544"/>
           </a:xfrm>
           <a:prstGeom prst="rect">
             <a:avLst/>
@@ -760,8 +760,8 @@
         </p:nvSpPr>
         <p:spPr>
           <a:xfrm>
-            <a:off x="3535910" y="6089074"/>
-            <a:ext cx="6138026" cy="1420091"/>
+            <a:off x="15429426" y="25789021"/>
+            <a:ext cx="26784113" cy="6014503"/>
           </a:xfrm>
           <a:prstGeom prst="rect">
             <a:avLst/>
@@ -771,7 +771,7 @@
           </a:ln>
         </p:spPr>
         <p:txBody>
-          <a:bodyPr vert="horz" lIns="101870" tIns="50935" rIns="101870" bIns="50935" rtlCol="0">
+          <a:bodyPr vert="horz" lIns="431449" tIns="215725" rIns="431449" bIns="215725" rtlCol="0">
             <a:noAutofit/>
           </a:bodyPr>
           <a:lstStyle>
@@ -928,7 +928,7 @@
             </a:lvl9pPr>
           </a:lstStyle>
           <a:p>
-            <a:endParaRPr lang="en-US" dirty="0"/>
+            <a:endParaRPr lang="en-US" sz="4235" dirty="0"/>
           </a:p>
         </p:txBody>
       </p:sp>
@@ -942,8 +942,8 @@
         </p:nvSpPr>
         <p:spPr>
           <a:xfrm>
-            <a:off x="4125191" y="315395"/>
-            <a:ext cx="5538354" cy="1420091"/>
+            <a:off x="18000833" y="1335793"/>
+            <a:ext cx="24167363" cy="6014503"/>
           </a:xfrm>
           <a:prstGeom prst="rect">
             <a:avLst/>
@@ -953,7 +953,7 @@
           </a:ln>
         </p:spPr>
         <p:txBody>
-          <a:bodyPr vert="horz" lIns="101870" tIns="50935" rIns="101870" bIns="50935" rtlCol="0">
+          <a:bodyPr vert="horz" lIns="431449" tIns="215725" rIns="431449" bIns="215725" rtlCol="0">
             <a:noAutofit/>
           </a:bodyPr>
           <a:lstStyle>
@@ -1111,19 +1111,46 @@
           </a:lstStyle>
           <a:p>
             <a:pPr algn="ctr"/>
-            <a:endParaRPr lang="en-US" dirty="0"/>
-          </a:p>
-          <a:p>
-            <a:pPr algn="ctr"/>
-            <a:endParaRPr lang="en-US" dirty="0"/>
-          </a:p>
-          <a:p>
-            <a:pPr algn="ctr"/>
+            <a:endParaRPr lang="en-US" sz="4235" dirty="0"/>
+          </a:p>
+          <a:p>
+            <a:pPr algn="l"/>
             <a:r>
-              <a:rPr lang="en-US" sz="2800" dirty="0"/>
-              <a:t>Title</a:t>
+              <a:rPr lang="en-US" sz="16941" dirty="0" smtClean="0">
+                <a:latin typeface="Elephant" panose="02020904090505020303" pitchFamily="18" charset="0"/>
+              </a:rPr>
+              <a:t>Domino</a:t>
             </a:r>
-            <a:endParaRPr lang="en-US" dirty="0"/>
+            <a:r>
+              <a:rPr lang="en-US" sz="16941" baseline="0" dirty="0" smtClean="0">
+                <a:latin typeface="Elephant" panose="02020904090505020303" pitchFamily="18" charset="0"/>
+              </a:rPr>
+              <a:t> Computers</a:t>
+            </a:r>
+          </a:p>
+          <a:p>
+            <a:pPr algn="r"/>
+            <a:r>
+              <a:rPr lang="en-US" sz="11859" baseline="0" dirty="0" smtClean="0">
+                <a:solidFill>
+                  <a:schemeClr val="tx2">
+                    <a:lumMod val="60000"/>
+                    <a:lumOff val="40000"/>
+                  </a:schemeClr>
+                </a:solidFill>
+                <a:latin typeface="Leitura Sans Italic 4" panose="02000506000000020004" pitchFamily="50" charset="0"/>
+              </a:rPr>
+              <a:t>Knocking Down Logic</a:t>
+            </a:r>
+            <a:endParaRPr lang="en-US" sz="4235" dirty="0">
+              <a:solidFill>
+                <a:schemeClr val="tx2">
+                  <a:lumMod val="60000"/>
+                  <a:lumOff val="40000"/>
+                </a:schemeClr>
+              </a:solidFill>
+              <a:latin typeface="Leitura Sans Italic 4" panose="02000506000000020004" pitchFamily="50" charset="0"/>
+            </a:endParaRPr>
           </a:p>
         </p:txBody>
       </p:sp>
@@ -1137,6 +1164,13 @@
   <p:clrMapOvr>
     <a:masterClrMapping/>
   </p:clrMapOvr>
+  <p:timing>
+    <p:tnLst>
+      <p:par>
+        <p:cTn id="1" dur="indefinite" restart="never" nodeType="tmRoot"/>
+      </p:par>
+    </p:tnLst>
+  </p:timing>
 </p:sldLayout>
 </file>
 
@@ -1169,8 +1203,8 @@
         </p:nvSpPr>
         <p:spPr>
           <a:xfrm>
-            <a:off x="354014" y="3270356"/>
-            <a:ext cx="2762249" cy="4273444"/>
+            <a:off x="1544791" y="13850920"/>
+            <a:ext cx="12053450" cy="18099292"/>
           </a:xfrm>
         </p:spPr>
         <p:txBody>
@@ -1179,7 +1213,7 @@
           </a:bodyPr>
           <a:lstStyle>
             <a:lvl1pPr algn="l">
-              <a:defRPr sz="1000" b="0" i="0">
+              <a:defRPr sz="4235" b="0" i="0">
                 <a:solidFill>
                   <a:schemeClr val="tx1"/>
                 </a:solidFill>
@@ -1208,8 +1242,8 @@
         </p:nvSpPr>
         <p:spPr>
           <a:xfrm>
-            <a:off x="3543300" y="3270356"/>
-            <a:ext cx="2959100" cy="4273444"/>
+            <a:off x="15461673" y="13850920"/>
+            <a:ext cx="12912436" cy="18099292"/>
           </a:xfrm>
         </p:spPr>
         <p:txBody>
@@ -1226,7 +1260,7 @@
               </a:spcAft>
               <a:buFontTx/>
               <a:buNone/>
-              <a:defRPr sz="1000" baseline="0">
+              <a:defRPr sz="4235" baseline="0">
                 <a:latin typeface="LeituraSans-Grot 1"/>
               </a:defRPr>
             </a:lvl1pPr>
@@ -1239,7 +1273,7 @@
               </a:spcAft>
               <a:buFontTx/>
               <a:buNone/>
-              <a:defRPr sz="1000" baseline="0">
+              <a:defRPr sz="4235" baseline="0">
                 <a:latin typeface="LeituraSans-Grot 1"/>
               </a:defRPr>
             </a:lvl2pPr>
@@ -1252,7 +1286,7 @@
               </a:spcAft>
               <a:buFontTx/>
               <a:buNone/>
-              <a:defRPr sz="1000" baseline="0">
+              <a:defRPr sz="4235" baseline="0">
                 <a:latin typeface="LeituraSans-Grot 1"/>
               </a:defRPr>
             </a:lvl3pPr>
@@ -1265,7 +1299,7 @@
               </a:spcAft>
               <a:buFontTx/>
               <a:buNone/>
-              <a:defRPr sz="1000" baseline="0">
+              <a:defRPr sz="4235" baseline="0">
                 <a:latin typeface="LeituraSans-Grot 1"/>
               </a:defRPr>
             </a:lvl4pPr>
@@ -1278,7 +1312,7 @@
               </a:spcAft>
               <a:buFontTx/>
               <a:buNone/>
-              <a:defRPr sz="1000" baseline="0">
+              <a:defRPr sz="4235" baseline="0">
                 <a:latin typeface="LeituraSans-Grot 1"/>
               </a:defRPr>
             </a:lvl5pPr>
@@ -1304,8 +1338,8 @@
         </p:nvSpPr>
         <p:spPr>
           <a:xfrm>
-            <a:off x="6927850" y="3270356"/>
-            <a:ext cx="2761488" cy="4267094"/>
+            <a:off x="30230618" y="13850920"/>
+            <a:ext cx="12050129" cy="18072398"/>
           </a:xfrm>
         </p:spPr>
         <p:txBody>
@@ -1316,35 +1350,35 @@
             <a:lvl1pPr marL="0" indent="0">
               <a:buFontTx/>
               <a:buNone/>
-              <a:defRPr sz="1000" baseline="0">
+              <a:defRPr sz="4235" baseline="0">
                 <a:latin typeface="LeituraSans-Grot 1"/>
               </a:defRPr>
             </a:lvl1pPr>
-            <a:lvl2pPr marL="509352" indent="0">
+            <a:lvl2pPr marL="2157259" indent="0">
               <a:buFontTx/>
               <a:buNone/>
-              <a:defRPr sz="1000" baseline="0">
+              <a:defRPr sz="4235" baseline="0">
                 <a:latin typeface="LeituraSans-Grot 1"/>
               </a:defRPr>
             </a:lvl2pPr>
-            <a:lvl3pPr marL="1018706" indent="0">
+            <a:lvl3pPr marL="4314526" indent="0">
               <a:buFontTx/>
               <a:buNone/>
-              <a:defRPr sz="1000" baseline="0">
+              <a:defRPr sz="4235" baseline="0">
                 <a:latin typeface="LeituraSans-Grot 1"/>
               </a:defRPr>
             </a:lvl3pPr>
-            <a:lvl4pPr marL="1528058" indent="0">
+            <a:lvl4pPr marL="6471784" indent="0">
               <a:buFontTx/>
               <a:buNone/>
-              <a:defRPr sz="1000" baseline="0">
+              <a:defRPr sz="4235" baseline="0">
                 <a:latin typeface="LeituraSans-Grot 1"/>
               </a:defRPr>
             </a:lvl4pPr>
-            <a:lvl5pPr marL="2037411" indent="0">
+            <a:lvl5pPr marL="8629047" indent="0">
               <a:buFontTx/>
               <a:buNone/>
-              <a:defRPr sz="1000" baseline="0">
+              <a:defRPr sz="4235" baseline="0">
                 <a:latin typeface="LeituraSans-Grot 1"/>
               </a:defRPr>
             </a:lvl5pPr>
@@ -1366,21 +1400,21 @@
         </p:nvSpPr>
         <p:spPr>
           <a:xfrm>
-            <a:off x="354014" y="292099"/>
-            <a:ext cx="2959099" cy="285750"/>
-          </a:xfrm>
-          <a:prstGeom prst="rect">
-            <a:avLst/>
-          </a:prstGeom>
-        </p:spPr>
-        <p:txBody>
-          <a:bodyPr vert="horz" wrap="none" lIns="101870" tIns="50935" rIns="101870" bIns="50935" rtlCol="0" anchor="ctr" anchorCtr="0">
+            <a:off x="1544791" y="1237125"/>
+            <a:ext cx="12912432" cy="1210235"/>
+          </a:xfrm>
+          <a:prstGeom prst="rect">
+            <a:avLst/>
+          </a:prstGeom>
+        </p:spPr>
+        <p:txBody>
+          <a:bodyPr vert="horz" wrap="none" lIns="431449" tIns="215725" rIns="431449" bIns="215725" rtlCol="0" anchor="ctr" anchorCtr="0">
             <a:noAutofit/>
           </a:bodyPr>
           <a:lstStyle/>
           <a:p>
             <a:r>
-              <a:rPr lang="en-US" sz="800" baseline="0" dirty="0">
+              <a:rPr lang="en-US" sz="3388" baseline="0" dirty="0">
                 <a:solidFill>
                   <a:schemeClr val="bg1"/>
                 </a:solidFill>
@@ -1399,8 +1433,8 @@
         </p:nvSpPr>
         <p:spPr>
           <a:xfrm>
-            <a:off x="70336" y="100993"/>
-            <a:ext cx="9907675" cy="2843174"/>
+            <a:off x="306923" y="427735"/>
+            <a:ext cx="43233491" cy="12041678"/>
           </a:xfrm>
           <a:prstGeom prst="rect">
             <a:avLst/>
@@ -1433,7 +1467,7 @@
           <a:lstStyle/>
           <a:p>
             <a:pPr algn="ctr"/>
-            <a:endParaRPr lang="en-US"/>
+            <a:endParaRPr lang="en-US" sz="36487"/>
           </a:p>
         </p:txBody>
       </p:sp>
@@ -1453,8 +1487,8 @@
         </p:blipFill>
         <p:spPr>
           <a:xfrm>
-            <a:off x="85730" y="100993"/>
-            <a:ext cx="3298815" cy="2094426"/>
+            <a:off x="374097" y="427735"/>
+            <a:ext cx="14394829" cy="8870510"/>
           </a:xfrm>
           <a:prstGeom prst="rect">
             <a:avLst/>
@@ -1469,8 +1503,8 @@
         </p:nvSpPr>
         <p:spPr>
           <a:xfrm>
-            <a:off x="277851" y="3143024"/>
-            <a:ext cx="2931331" cy="4501662"/>
+            <a:off x="1212443" y="13311631"/>
+            <a:ext cx="12791263" cy="19065863"/>
           </a:xfrm>
           <a:prstGeom prst="rect">
             <a:avLst/>
@@ -1501,7 +1535,7 @@
           <a:lstStyle/>
           <a:p>
             <a:pPr algn="ctr"/>
-            <a:endParaRPr lang="en-US"/>
+            <a:endParaRPr lang="en-US" sz="36487"/>
           </a:p>
         </p:txBody>
       </p:sp>
@@ -1513,8 +1547,8 @@
         </p:nvSpPr>
         <p:spPr>
           <a:xfrm>
-            <a:off x="3454805" y="3143024"/>
-            <a:ext cx="3157010" cy="4501662"/>
+            <a:off x="15075513" y="13311631"/>
+            <a:ext cx="13776044" cy="19065863"/>
           </a:xfrm>
           <a:prstGeom prst="rect">
             <a:avLst/>
@@ -1545,7 +1579,7 @@
           <a:lstStyle/>
           <a:p>
             <a:pPr algn="ctr"/>
-            <a:endParaRPr lang="en-US"/>
+            <a:endParaRPr lang="en-US" sz="36487"/>
           </a:p>
         </p:txBody>
       </p:sp>
@@ -1557,8 +1591,8 @@
         </p:nvSpPr>
         <p:spPr>
           <a:xfrm>
-            <a:off x="6841117" y="3143024"/>
-            <a:ext cx="2931331" cy="4501662"/>
+            <a:off x="29852149" y="13311631"/>
+            <a:ext cx="12791263" cy="19065863"/>
           </a:xfrm>
           <a:prstGeom prst="rect">
             <a:avLst/>
@@ -1589,7 +1623,7 @@
           <a:lstStyle/>
           <a:p>
             <a:pPr algn="ctr"/>
-            <a:endParaRPr lang="en-US"/>
+            <a:endParaRPr lang="en-US" sz="36487"/>
           </a:p>
         </p:txBody>
       </p:sp>
@@ -1631,8 +1665,8 @@
         </p:nvSpPr>
         <p:spPr>
           <a:xfrm>
-            <a:off x="3313113" y="812800"/>
-            <a:ext cx="6491287" cy="6724650"/>
+            <a:off x="14457223" y="3442447"/>
+            <a:ext cx="28325616" cy="28480871"/>
           </a:xfrm>
           <a:prstGeom prst="rect">
             <a:avLst/>
@@ -1664,7 +1698,7 @@
           <a:lstStyle/>
           <a:p>
             <a:pPr algn="ctr"/>
-            <a:endParaRPr lang="en-US"/>
+            <a:endParaRPr lang="en-US" sz="36487"/>
           </a:p>
         </p:txBody>
       </p:sp>
@@ -1680,8 +1714,8 @@
         </p:nvSpPr>
         <p:spPr>
           <a:xfrm>
-            <a:off x="354014" y="812800"/>
-            <a:ext cx="2762249" cy="6731000"/>
+            <a:off x="1544791" y="3442447"/>
+            <a:ext cx="12053450" cy="28507765"/>
           </a:xfrm>
         </p:spPr>
         <p:txBody>
@@ -1690,7 +1724,7 @@
           </a:bodyPr>
           <a:lstStyle>
             <a:lvl1pPr algn="l">
-              <a:defRPr sz="1000" b="0" i="0">
+              <a:defRPr sz="4235" b="0" i="0">
                 <a:latin typeface="LeituraSans-Grot 1"/>
                 <a:cs typeface="LeituraSans-Grot 1"/>
               </a:defRPr>
@@ -1712,8 +1746,8 @@
         </p:nvSpPr>
         <p:spPr bwMode="auto">
           <a:xfrm>
-            <a:off x="214313" y="222250"/>
-            <a:ext cx="139701" cy="393700"/>
+            <a:off x="935186" y="941294"/>
+            <a:ext cx="609604" cy="1667435"/>
           </a:xfrm>
           <a:prstGeom prst="rect">
             <a:avLst/>
@@ -1731,14 +1765,14 @@
           <a:effectLst/>
         </p:spPr>
         <p:txBody>
-          <a:bodyPr vert="horz" wrap="square" lIns="91440" tIns="45720" rIns="91440" bIns="45720" numCol="1" rtlCol="0" anchor="t" anchorCtr="0" compatLnSpc="1">
+          <a:bodyPr vert="horz" wrap="square" lIns="387275" tIns="193638" rIns="387275" bIns="193638" numCol="1" rtlCol="0" anchor="t" anchorCtr="0" compatLnSpc="1">
             <a:prstTxWarp prst="textNoShape">
               <a:avLst/>
             </a:prstTxWarp>
           </a:bodyPr>
           <a:lstStyle/>
           <a:p>
-            <a:pPr marL="0" marR="0" indent="0" algn="l" defTabSz="914400" rtl="0" eaLnBrk="0" fontAlgn="base" latinLnBrk="0" hangingPunct="0">
+            <a:pPr marL="0" marR="0" indent="0" algn="l" defTabSz="3872758" rtl="0" eaLnBrk="0" fontAlgn="base" latinLnBrk="0" hangingPunct="0">
               <a:lnSpc>
                 <a:spcPct val="100000"/>
               </a:lnSpc>
@@ -1754,7 +1788,7 @@
               <a:buNone/>
               <a:tabLst/>
             </a:pPr>
-            <a:endParaRPr kumimoji="0" lang="en-US" sz="2400" b="0" i="0" u="none" strike="noStrike" cap="none" normalizeH="0" baseline="0">
+            <a:endParaRPr kumimoji="0" lang="en-US" sz="10165" b="0" i="0" u="none" strike="noStrike" cap="none" normalizeH="0" baseline="0">
               <a:ln>
                 <a:noFill/>
               </a:ln>
@@ -1776,8 +1810,8 @@
         </p:nvSpPr>
         <p:spPr bwMode="auto">
           <a:xfrm>
-            <a:off x="354014" y="222250"/>
-            <a:ext cx="2959099" cy="393700"/>
+            <a:off x="1544791" y="941294"/>
+            <a:ext cx="12912432" cy="1667435"/>
           </a:xfrm>
           <a:prstGeom prst="rect">
             <a:avLst/>
@@ -1795,14 +1829,14 @@
           <a:effectLst/>
         </p:spPr>
         <p:txBody>
-          <a:bodyPr vert="horz" wrap="square" lIns="91440" tIns="45720" rIns="91440" bIns="45720" numCol="1" rtlCol="0" anchor="t" anchorCtr="0" compatLnSpc="1">
+          <a:bodyPr vert="horz" wrap="square" lIns="387275" tIns="193638" rIns="387275" bIns="193638" numCol="1" rtlCol="0" anchor="t" anchorCtr="0" compatLnSpc="1">
             <a:prstTxWarp prst="textNoShape">
               <a:avLst/>
             </a:prstTxWarp>
           </a:bodyPr>
           <a:lstStyle/>
           <a:p>
-            <a:pPr marL="0" marR="0" indent="0" algn="l" defTabSz="914400" rtl="0" eaLnBrk="0" fontAlgn="base" latinLnBrk="0" hangingPunct="0">
+            <a:pPr marL="0" marR="0" indent="0" algn="l" defTabSz="3872758" rtl="0" eaLnBrk="0" fontAlgn="base" latinLnBrk="0" hangingPunct="0">
               <a:lnSpc>
                 <a:spcPct val="100000"/>
               </a:lnSpc>
@@ -1818,7 +1852,7 @@
               <a:buNone/>
               <a:tabLst/>
             </a:pPr>
-            <a:endParaRPr kumimoji="0" lang="en-US" sz="2400" b="0" i="0" u="none" strike="noStrike" cap="none" normalizeH="0" baseline="0">
+            <a:endParaRPr kumimoji="0" lang="en-US" sz="10165" b="0" i="0" u="none" strike="noStrike" cap="none" normalizeH="0" baseline="0">
               <a:ln>
                 <a:noFill/>
               </a:ln>
@@ -1840,8 +1874,8 @@
         </p:nvSpPr>
         <p:spPr bwMode="auto">
           <a:xfrm>
-            <a:off x="3313113" y="222250"/>
-            <a:ext cx="630237" cy="393700"/>
+            <a:off x="14457223" y="941294"/>
+            <a:ext cx="2750125" cy="1667435"/>
           </a:xfrm>
           <a:prstGeom prst="rect">
             <a:avLst/>
@@ -1859,14 +1893,14 @@
           <a:effectLst/>
         </p:spPr>
         <p:txBody>
-          <a:bodyPr vert="horz" wrap="square" lIns="91440" tIns="45720" rIns="91440" bIns="45720" numCol="1" rtlCol="0" anchor="t" anchorCtr="0" compatLnSpc="1">
+          <a:bodyPr vert="horz" wrap="square" lIns="387275" tIns="193638" rIns="387275" bIns="193638" numCol="1" rtlCol="0" anchor="t" anchorCtr="0" compatLnSpc="1">
             <a:prstTxWarp prst="textNoShape">
               <a:avLst/>
             </a:prstTxWarp>
           </a:bodyPr>
           <a:lstStyle/>
           <a:p>
-            <a:pPr marL="0" marR="0" indent="0" algn="l" defTabSz="914400" rtl="0" eaLnBrk="0" fontAlgn="base" latinLnBrk="0" hangingPunct="0">
+            <a:pPr marL="0" marR="0" indent="0" algn="l" defTabSz="3872758" rtl="0" eaLnBrk="0" fontAlgn="base" latinLnBrk="0" hangingPunct="0">
               <a:lnSpc>
                 <a:spcPct val="100000"/>
               </a:lnSpc>
@@ -1882,7 +1916,7 @@
               <a:buNone/>
               <a:tabLst/>
             </a:pPr>
-            <a:endParaRPr kumimoji="0" lang="en-US" sz="2400" b="0" i="0" u="none" strike="noStrike" cap="none" normalizeH="0" baseline="0">
+            <a:endParaRPr kumimoji="0" lang="en-US" sz="10165" b="0" i="0" u="none" strike="noStrike" cap="none" normalizeH="0" baseline="0">
               <a:ln>
                 <a:noFill/>
               </a:ln>
@@ -1904,8 +1938,8 @@
         </p:nvSpPr>
         <p:spPr bwMode="auto">
           <a:xfrm>
-            <a:off x="3943350" y="222250"/>
-            <a:ext cx="5886450" cy="393700"/>
+            <a:off x="17207346" y="941294"/>
+            <a:ext cx="25686327" cy="1667435"/>
           </a:xfrm>
           <a:prstGeom prst="rect">
             <a:avLst/>
@@ -1923,14 +1957,14 @@
           <a:effectLst/>
         </p:spPr>
         <p:txBody>
-          <a:bodyPr vert="horz" wrap="square" lIns="91440" tIns="45720" rIns="91440" bIns="45720" numCol="1" rtlCol="0" anchor="t" anchorCtr="0" compatLnSpc="1">
+          <a:bodyPr vert="horz" wrap="square" lIns="387275" tIns="193638" rIns="387275" bIns="193638" numCol="1" rtlCol="0" anchor="t" anchorCtr="0" compatLnSpc="1">
             <a:prstTxWarp prst="textNoShape">
               <a:avLst/>
             </a:prstTxWarp>
           </a:bodyPr>
           <a:lstStyle/>
           <a:p>
-            <a:pPr marL="0" marR="0" indent="0" algn="l" defTabSz="914400" rtl="0" eaLnBrk="0" fontAlgn="base" latinLnBrk="0" hangingPunct="0">
+            <a:pPr marL="0" marR="0" indent="0" algn="l" defTabSz="3872758" rtl="0" eaLnBrk="0" fontAlgn="base" latinLnBrk="0" hangingPunct="0">
               <a:lnSpc>
                 <a:spcPct val="100000"/>
               </a:lnSpc>
@@ -1947,7 +1981,7 @@
               <a:tabLst/>
             </a:pPr>
             <a:r>
-              <a:rPr kumimoji="0" lang="en-US" sz="2400" b="0" i="0" u="none" strike="noStrike" cap="none" normalizeH="0" baseline="0" dirty="0">
+              <a:rPr kumimoji="0" lang="en-US" sz="10165" b="0" i="0" u="none" strike="noStrike" cap="none" normalizeH="0" baseline="0" dirty="0">
                 <a:ln>
                   <a:noFill/>
                 </a:ln>
@@ -1971,21 +2005,21 @@
         </p:nvSpPr>
         <p:spPr>
           <a:xfrm>
-            <a:off x="354014" y="292099"/>
-            <a:ext cx="2959099" cy="285750"/>
-          </a:xfrm>
-          <a:prstGeom prst="rect">
-            <a:avLst/>
-          </a:prstGeom>
-        </p:spPr>
-        <p:txBody>
-          <a:bodyPr vert="horz" wrap="none" lIns="101870" tIns="50935" rIns="101870" bIns="50935" rtlCol="0" anchor="ctr" anchorCtr="0">
+            <a:off x="1544791" y="1237125"/>
+            <a:ext cx="12912432" cy="1210235"/>
+          </a:xfrm>
+          <a:prstGeom prst="rect">
+            <a:avLst/>
+          </a:prstGeom>
+        </p:spPr>
+        <p:txBody>
+          <a:bodyPr vert="horz" wrap="none" lIns="431449" tIns="215725" rIns="431449" bIns="215725" rtlCol="0" anchor="ctr" anchorCtr="0">
             <a:noAutofit/>
           </a:bodyPr>
           <a:lstStyle/>
           <a:p>
             <a:r>
-              <a:rPr lang="en-US" sz="800" baseline="0" dirty="0">
+              <a:rPr lang="en-US" sz="3388" baseline="0" dirty="0">
                 <a:solidFill>
                   <a:schemeClr val="bg1"/>
                 </a:solidFill>
@@ -2034,8 +2068,8 @@
         </p:nvSpPr>
         <p:spPr>
           <a:xfrm>
-            <a:off x="214313" y="812800"/>
-            <a:ext cx="6491287" cy="6724650"/>
+            <a:off x="935186" y="3442447"/>
+            <a:ext cx="28325616" cy="28480871"/>
           </a:xfrm>
           <a:prstGeom prst="rect">
             <a:avLst/>
@@ -2067,7 +2101,7 @@
           <a:lstStyle/>
           <a:p>
             <a:pPr algn="ctr"/>
-            <a:endParaRPr lang="en-US"/>
+            <a:endParaRPr lang="en-US" sz="36487"/>
           </a:p>
         </p:txBody>
       </p:sp>
@@ -2083,8 +2117,8 @@
         </p:nvSpPr>
         <p:spPr>
           <a:xfrm>
-            <a:off x="6927850" y="812800"/>
-            <a:ext cx="2774950" cy="6724650"/>
+            <a:off x="30230618" y="3442447"/>
+            <a:ext cx="12108873" cy="28480871"/>
           </a:xfrm>
         </p:spPr>
         <p:txBody>
@@ -2095,35 +2129,35 @@
             <a:lvl1pPr marL="0" indent="0">
               <a:buFontTx/>
               <a:buNone/>
-              <a:defRPr sz="1000" baseline="0">
+              <a:defRPr sz="4235" baseline="0">
                 <a:latin typeface="LeituraSans-Grot 1"/>
               </a:defRPr>
             </a:lvl1pPr>
-            <a:lvl2pPr marL="509352" indent="0">
+            <a:lvl2pPr marL="2157259" indent="0">
               <a:buFontTx/>
               <a:buNone/>
-              <a:defRPr sz="1000" baseline="0">
+              <a:defRPr sz="4235" baseline="0">
                 <a:latin typeface="LeituraSans-Grot 1"/>
               </a:defRPr>
             </a:lvl2pPr>
-            <a:lvl3pPr marL="1018706" indent="0">
+            <a:lvl3pPr marL="4314526" indent="0">
               <a:buFontTx/>
               <a:buNone/>
-              <a:defRPr sz="1000" baseline="0">
+              <a:defRPr sz="4235" baseline="0">
                 <a:latin typeface="LeituraSans-Grot 1"/>
               </a:defRPr>
             </a:lvl3pPr>
-            <a:lvl4pPr marL="1528058" indent="0">
+            <a:lvl4pPr marL="6471784" indent="0">
               <a:buFontTx/>
               <a:buNone/>
-              <a:defRPr sz="1000" baseline="0">
+              <a:defRPr sz="4235" baseline="0">
                 <a:latin typeface="LeituraSans-Grot 1"/>
               </a:defRPr>
             </a:lvl4pPr>
-            <a:lvl5pPr marL="2037411" indent="0">
+            <a:lvl5pPr marL="8629047" indent="0">
               <a:buFontTx/>
               <a:buNone/>
-              <a:defRPr sz="1000" baseline="0">
+              <a:defRPr sz="4235" baseline="0">
                 <a:latin typeface="LeituraSans-Grot 1"/>
               </a:defRPr>
             </a:lvl5pPr>
@@ -2145,8 +2179,8 @@
         </p:nvSpPr>
         <p:spPr bwMode="auto">
           <a:xfrm>
-            <a:off x="214313" y="222250"/>
-            <a:ext cx="139701" cy="393700"/>
+            <a:off x="935186" y="941294"/>
+            <a:ext cx="609604" cy="1667435"/>
           </a:xfrm>
           <a:prstGeom prst="rect">
             <a:avLst/>
@@ -2164,14 +2198,14 @@
           <a:effectLst/>
         </p:spPr>
         <p:txBody>
-          <a:bodyPr vert="horz" wrap="square" lIns="91440" tIns="45720" rIns="91440" bIns="45720" numCol="1" rtlCol="0" anchor="t" anchorCtr="0" compatLnSpc="1">
+          <a:bodyPr vert="horz" wrap="square" lIns="387275" tIns="193638" rIns="387275" bIns="193638" numCol="1" rtlCol="0" anchor="t" anchorCtr="0" compatLnSpc="1">
             <a:prstTxWarp prst="textNoShape">
               <a:avLst/>
             </a:prstTxWarp>
           </a:bodyPr>
           <a:lstStyle/>
           <a:p>
-            <a:pPr marL="0" marR="0" indent="0" algn="l" defTabSz="914400" rtl="0" eaLnBrk="0" fontAlgn="base" latinLnBrk="0" hangingPunct="0">
+            <a:pPr marL="0" marR="0" indent="0" algn="l" defTabSz="3872758" rtl="0" eaLnBrk="0" fontAlgn="base" latinLnBrk="0" hangingPunct="0">
               <a:lnSpc>
                 <a:spcPct val="100000"/>
               </a:lnSpc>
@@ -2187,7 +2221,7 @@
               <a:buNone/>
               <a:tabLst/>
             </a:pPr>
-            <a:endParaRPr kumimoji="0" lang="en-US" sz="2400" b="0" i="0" u="none" strike="noStrike" cap="none" normalizeH="0" baseline="0">
+            <a:endParaRPr kumimoji="0" lang="en-US" sz="10165" b="0" i="0" u="none" strike="noStrike" cap="none" normalizeH="0" baseline="0">
               <a:ln>
                 <a:noFill/>
               </a:ln>
@@ -2209,8 +2243,8 @@
         </p:nvSpPr>
         <p:spPr bwMode="auto">
           <a:xfrm>
-            <a:off x="354014" y="222250"/>
-            <a:ext cx="2959099" cy="393700"/>
+            <a:off x="1544791" y="941294"/>
+            <a:ext cx="12912432" cy="1667435"/>
           </a:xfrm>
           <a:prstGeom prst="rect">
             <a:avLst/>
@@ -2228,14 +2262,14 @@
           <a:effectLst/>
         </p:spPr>
         <p:txBody>
-          <a:bodyPr vert="horz" wrap="square" lIns="91440" tIns="45720" rIns="91440" bIns="45720" numCol="1" rtlCol="0" anchor="t" anchorCtr="0" compatLnSpc="1">
+          <a:bodyPr vert="horz" wrap="square" lIns="387275" tIns="193638" rIns="387275" bIns="193638" numCol="1" rtlCol="0" anchor="t" anchorCtr="0" compatLnSpc="1">
             <a:prstTxWarp prst="textNoShape">
               <a:avLst/>
             </a:prstTxWarp>
           </a:bodyPr>
           <a:lstStyle/>
           <a:p>
-            <a:pPr marL="0" marR="0" indent="0" algn="l" defTabSz="914400" rtl="0" eaLnBrk="0" fontAlgn="base" latinLnBrk="0" hangingPunct="0">
+            <a:pPr marL="0" marR="0" indent="0" algn="l" defTabSz="3872758" rtl="0" eaLnBrk="0" fontAlgn="base" latinLnBrk="0" hangingPunct="0">
               <a:lnSpc>
                 <a:spcPct val="100000"/>
               </a:lnSpc>
@@ -2251,7 +2285,7 @@
               <a:buNone/>
               <a:tabLst/>
             </a:pPr>
-            <a:endParaRPr kumimoji="0" lang="en-US" sz="2400" b="0" i="0" u="none" strike="noStrike" cap="none" normalizeH="0" baseline="0">
+            <a:endParaRPr kumimoji="0" lang="en-US" sz="10165" b="0" i="0" u="none" strike="noStrike" cap="none" normalizeH="0" baseline="0">
               <a:ln>
                 <a:noFill/>
               </a:ln>
@@ -2273,8 +2307,8 @@
         </p:nvSpPr>
         <p:spPr bwMode="auto">
           <a:xfrm>
-            <a:off x="3313113" y="222250"/>
-            <a:ext cx="630237" cy="393700"/>
+            <a:off x="14457223" y="941294"/>
+            <a:ext cx="2750125" cy="1667435"/>
           </a:xfrm>
           <a:prstGeom prst="rect">
             <a:avLst/>
@@ -2292,14 +2326,14 @@
           <a:effectLst/>
         </p:spPr>
         <p:txBody>
-          <a:bodyPr vert="horz" wrap="square" lIns="91440" tIns="45720" rIns="91440" bIns="45720" numCol="1" rtlCol="0" anchor="t" anchorCtr="0" compatLnSpc="1">
+          <a:bodyPr vert="horz" wrap="square" lIns="387275" tIns="193638" rIns="387275" bIns="193638" numCol="1" rtlCol="0" anchor="t" anchorCtr="0" compatLnSpc="1">
             <a:prstTxWarp prst="textNoShape">
               <a:avLst/>
             </a:prstTxWarp>
           </a:bodyPr>
           <a:lstStyle/>
           <a:p>
-            <a:pPr marL="0" marR="0" indent="0" algn="l" defTabSz="914400" rtl="0" eaLnBrk="0" fontAlgn="base" latinLnBrk="0" hangingPunct="0">
+            <a:pPr marL="0" marR="0" indent="0" algn="l" defTabSz="3872758" rtl="0" eaLnBrk="0" fontAlgn="base" latinLnBrk="0" hangingPunct="0">
               <a:lnSpc>
                 <a:spcPct val="100000"/>
               </a:lnSpc>
@@ -2315,7 +2349,7 @@
               <a:buNone/>
               <a:tabLst/>
             </a:pPr>
-            <a:endParaRPr kumimoji="0" lang="en-US" sz="2400" b="0" i="0" u="none" strike="noStrike" cap="none" normalizeH="0" baseline="0">
+            <a:endParaRPr kumimoji="0" lang="en-US" sz="10165" b="0" i="0" u="none" strike="noStrike" cap="none" normalizeH="0" baseline="0">
               <a:ln>
                 <a:noFill/>
               </a:ln>
@@ -2337,8 +2371,8 @@
         </p:nvSpPr>
         <p:spPr bwMode="auto">
           <a:xfrm>
-            <a:off x="3943350" y="222250"/>
-            <a:ext cx="5886450" cy="393700"/>
+            <a:off x="17207346" y="941294"/>
+            <a:ext cx="25686327" cy="1667435"/>
           </a:xfrm>
           <a:prstGeom prst="rect">
             <a:avLst/>
@@ -2356,14 +2390,14 @@
           <a:effectLst/>
         </p:spPr>
         <p:txBody>
-          <a:bodyPr vert="horz" wrap="square" lIns="91440" tIns="45720" rIns="91440" bIns="45720" numCol="1" rtlCol="0" anchor="t" anchorCtr="0" compatLnSpc="1">
+          <a:bodyPr vert="horz" wrap="square" lIns="387275" tIns="193638" rIns="387275" bIns="193638" numCol="1" rtlCol="0" anchor="t" anchorCtr="0" compatLnSpc="1">
             <a:prstTxWarp prst="textNoShape">
               <a:avLst/>
             </a:prstTxWarp>
           </a:bodyPr>
           <a:lstStyle/>
           <a:p>
-            <a:pPr marL="0" marR="0" indent="0" algn="l" defTabSz="914400" rtl="0" eaLnBrk="0" fontAlgn="base" latinLnBrk="0" hangingPunct="0">
+            <a:pPr marL="0" marR="0" indent="0" algn="l" defTabSz="3872758" rtl="0" eaLnBrk="0" fontAlgn="base" latinLnBrk="0" hangingPunct="0">
               <a:lnSpc>
                 <a:spcPct val="100000"/>
               </a:lnSpc>
@@ -2380,7 +2414,7 @@
               <a:tabLst/>
             </a:pPr>
             <a:r>
-              <a:rPr kumimoji="0" lang="en-US" sz="2400" b="0" i="0" u="none" strike="noStrike" cap="none" normalizeH="0" baseline="0" dirty="0">
+              <a:rPr kumimoji="0" lang="en-US" sz="10165" b="0" i="0" u="none" strike="noStrike" cap="none" normalizeH="0" baseline="0" dirty="0">
                 <a:ln>
                   <a:noFill/>
                 </a:ln>
@@ -2404,21 +2438,21 @@
         </p:nvSpPr>
         <p:spPr>
           <a:xfrm>
-            <a:off x="354014" y="292099"/>
-            <a:ext cx="2959099" cy="285750"/>
-          </a:xfrm>
-          <a:prstGeom prst="rect">
-            <a:avLst/>
-          </a:prstGeom>
-        </p:spPr>
-        <p:txBody>
-          <a:bodyPr vert="horz" wrap="none" lIns="101870" tIns="50935" rIns="101870" bIns="50935" rtlCol="0" anchor="ctr" anchorCtr="0">
+            <a:off x="1544791" y="1237125"/>
+            <a:ext cx="12912432" cy="1210235"/>
+          </a:xfrm>
+          <a:prstGeom prst="rect">
+            <a:avLst/>
+          </a:prstGeom>
+        </p:spPr>
+        <p:txBody>
+          <a:bodyPr vert="horz" wrap="none" lIns="431449" tIns="215725" rIns="431449" bIns="215725" rtlCol="0" anchor="ctr" anchorCtr="0">
             <a:noAutofit/>
           </a:bodyPr>
           <a:lstStyle/>
           <a:p>
             <a:r>
-              <a:rPr lang="en-US" sz="800" baseline="0" dirty="0">
+              <a:rPr lang="en-US" sz="3388" baseline="0" dirty="0">
                 <a:solidFill>
                   <a:schemeClr val="bg1"/>
                 </a:solidFill>
@@ -2467,8 +2501,8 @@
         </p:nvSpPr>
         <p:spPr>
           <a:xfrm>
-            <a:off x="214313" y="812800"/>
-            <a:ext cx="6491287" cy="2336800"/>
+            <a:off x="935186" y="3442447"/>
+            <a:ext cx="28325616" cy="9897035"/>
           </a:xfrm>
           <a:prstGeom prst="rect">
             <a:avLst/>
@@ -2500,7 +2534,7 @@
           <a:lstStyle/>
           <a:p>
             <a:pPr algn="ctr"/>
-            <a:endParaRPr lang="en-US"/>
+            <a:endParaRPr lang="en-US" sz="36487"/>
           </a:p>
         </p:txBody>
       </p:sp>
@@ -2516,8 +2550,8 @@
         </p:nvSpPr>
         <p:spPr>
           <a:xfrm>
-            <a:off x="354014" y="3270356"/>
-            <a:ext cx="2762249" cy="4273444"/>
+            <a:off x="1544791" y="13850920"/>
+            <a:ext cx="12053450" cy="18099292"/>
           </a:xfrm>
         </p:spPr>
         <p:txBody>
@@ -2526,7 +2560,7 @@
           </a:bodyPr>
           <a:lstStyle>
             <a:lvl1pPr algn="l">
-              <a:defRPr sz="1000" b="0" i="0">
+              <a:defRPr sz="4235" b="0" i="0">
                 <a:latin typeface="LeituraSans-Grot 1"/>
                 <a:cs typeface="LeituraSans-Grot 1"/>
               </a:defRPr>
@@ -2552,8 +2586,8 @@
         </p:nvSpPr>
         <p:spPr>
           <a:xfrm>
-            <a:off x="3543300" y="3270356"/>
-            <a:ext cx="2959100" cy="4273444"/>
+            <a:off x="15461673" y="13850920"/>
+            <a:ext cx="12912436" cy="18099292"/>
           </a:xfrm>
         </p:spPr>
         <p:txBody>
@@ -2570,7 +2604,7 @@
               </a:spcAft>
               <a:buFontTx/>
               <a:buNone/>
-              <a:defRPr sz="1000" baseline="0">
+              <a:defRPr sz="4235" baseline="0">
                 <a:latin typeface="LeituraSans-Grot 1"/>
               </a:defRPr>
             </a:lvl1pPr>
@@ -2583,7 +2617,7 @@
               </a:spcAft>
               <a:buFontTx/>
               <a:buNone/>
-              <a:defRPr sz="1000" baseline="0">
+              <a:defRPr sz="4235" baseline="0">
                 <a:latin typeface="LeituraSans-Grot 1"/>
               </a:defRPr>
             </a:lvl2pPr>
@@ -2596,7 +2630,7 @@
               </a:spcAft>
               <a:buFontTx/>
               <a:buNone/>
-              <a:defRPr sz="1000" baseline="0">
+              <a:defRPr sz="4235" baseline="0">
                 <a:latin typeface="LeituraSans-Grot 1"/>
               </a:defRPr>
             </a:lvl3pPr>
@@ -2609,7 +2643,7 @@
               </a:spcAft>
               <a:buFontTx/>
               <a:buNone/>
-              <a:defRPr sz="1000" baseline="0">
+              <a:defRPr sz="4235" baseline="0">
                 <a:latin typeface="LeituraSans-Grot 1"/>
               </a:defRPr>
             </a:lvl4pPr>
@@ -2622,7 +2656,7 @@
               </a:spcAft>
               <a:buFontTx/>
               <a:buNone/>
-              <a:defRPr sz="1000" baseline="0">
+              <a:defRPr sz="4235" baseline="0">
                 <a:latin typeface="LeituraSans-Grot 1"/>
               </a:defRPr>
             </a:lvl5pPr>
@@ -2648,8 +2682,8 @@
         </p:nvSpPr>
         <p:spPr>
           <a:xfrm>
-            <a:off x="6927850" y="812800"/>
-            <a:ext cx="2774950" cy="3073400"/>
+            <a:off x="30230618" y="3442447"/>
+            <a:ext cx="12108873" cy="13016753"/>
           </a:xfrm>
         </p:spPr>
         <p:txBody>
@@ -2660,35 +2694,35 @@
             <a:lvl1pPr marL="0" indent="0">
               <a:buFontTx/>
               <a:buNone/>
-              <a:defRPr sz="1000" baseline="0">
+              <a:defRPr sz="4235" baseline="0">
                 <a:latin typeface="LeituraSans-Grot 1"/>
               </a:defRPr>
             </a:lvl1pPr>
-            <a:lvl2pPr marL="509352" indent="0">
+            <a:lvl2pPr marL="2157259" indent="0">
               <a:buFontTx/>
               <a:buNone/>
-              <a:defRPr sz="1000" baseline="0">
+              <a:defRPr sz="4235" baseline="0">
                 <a:latin typeface="LeituraSans-Grot 1"/>
               </a:defRPr>
             </a:lvl2pPr>
-            <a:lvl3pPr marL="1018706" indent="0">
+            <a:lvl3pPr marL="4314526" indent="0">
               <a:buFontTx/>
               <a:buNone/>
-              <a:defRPr sz="1000" baseline="0">
+              <a:defRPr sz="4235" baseline="0">
                 <a:latin typeface="LeituraSans-Grot 1"/>
               </a:defRPr>
             </a:lvl3pPr>
-            <a:lvl4pPr marL="1528058" indent="0">
+            <a:lvl4pPr marL="6471784" indent="0">
               <a:buFontTx/>
               <a:buNone/>
-              <a:defRPr sz="1000" baseline="0">
+              <a:defRPr sz="4235" baseline="0">
                 <a:latin typeface="LeituraSans-Grot 1"/>
               </a:defRPr>
             </a:lvl4pPr>
-            <a:lvl5pPr marL="2037411" indent="0">
+            <a:lvl5pPr marL="8629047" indent="0">
               <a:buFontTx/>
               <a:buNone/>
-              <a:defRPr sz="1000" baseline="0">
+              <a:defRPr sz="4235" baseline="0">
                 <a:latin typeface="LeituraSans-Grot 1"/>
               </a:defRPr>
             </a:lvl5pPr>
@@ -2710,8 +2744,8 @@
         </p:nvSpPr>
         <p:spPr>
           <a:xfrm>
-            <a:off x="8470900" y="812800"/>
-            <a:ext cx="1231900" cy="1168400"/>
+            <a:off x="36963927" y="3442447"/>
+            <a:ext cx="5375564" cy="4948518"/>
           </a:xfrm>
           <a:prstGeom prst="rect">
             <a:avLst/>
@@ -2743,7 +2777,7 @@
           <a:lstStyle/>
           <a:p>
             <a:pPr algn="ctr"/>
-            <a:endParaRPr lang="en-US"/>
+            <a:endParaRPr lang="en-US" sz="36487"/>
           </a:p>
         </p:txBody>
       </p:sp>
@@ -2759,8 +2793,8 @@
         </p:nvSpPr>
         <p:spPr>
           <a:xfrm>
-            <a:off x="6927850" y="4203700"/>
-            <a:ext cx="2774950" cy="3333750"/>
+            <a:off x="30230618" y="17803906"/>
+            <a:ext cx="12108873" cy="14119412"/>
           </a:xfrm>
         </p:spPr>
         <p:txBody>
@@ -2771,35 +2805,35 @@
             <a:lvl1pPr marL="0" indent="0">
               <a:buFontTx/>
               <a:buNone/>
-              <a:defRPr sz="1000" baseline="0">
+              <a:defRPr sz="4235" baseline="0">
                 <a:latin typeface="LeituraSans-Grot 1"/>
               </a:defRPr>
             </a:lvl1pPr>
-            <a:lvl2pPr marL="509352" indent="0">
+            <a:lvl2pPr marL="2157259" indent="0">
               <a:buFontTx/>
               <a:buNone/>
-              <a:defRPr sz="1000" baseline="0">
+              <a:defRPr sz="4235" baseline="0">
                 <a:latin typeface="LeituraSans-Grot 1"/>
               </a:defRPr>
             </a:lvl2pPr>
-            <a:lvl3pPr marL="1018706" indent="0">
+            <a:lvl3pPr marL="4314526" indent="0">
               <a:buFontTx/>
               <a:buNone/>
-              <a:defRPr sz="1000" baseline="0">
+              <a:defRPr sz="4235" baseline="0">
                 <a:latin typeface="LeituraSans-Grot 1"/>
               </a:defRPr>
             </a:lvl3pPr>
-            <a:lvl4pPr marL="1528058" indent="0">
+            <a:lvl4pPr marL="6471784" indent="0">
               <a:buFontTx/>
               <a:buNone/>
-              <a:defRPr sz="1000" baseline="0">
+              <a:defRPr sz="4235" baseline="0">
                 <a:latin typeface="LeituraSans-Grot 1"/>
               </a:defRPr>
             </a:lvl4pPr>
-            <a:lvl5pPr marL="2037411" indent="0">
+            <a:lvl5pPr marL="8629047" indent="0">
               <a:buFontTx/>
               <a:buNone/>
-              <a:defRPr sz="1000" baseline="0">
+              <a:defRPr sz="4235" baseline="0">
                 <a:latin typeface="LeituraSans-Grot 1"/>
               </a:defRPr>
             </a:lvl5pPr>
@@ -2821,8 +2855,8 @@
         </p:nvSpPr>
         <p:spPr>
           <a:xfrm>
-            <a:off x="8470900" y="4203700"/>
-            <a:ext cx="1231900" cy="1168400"/>
+            <a:off x="36963927" y="17803906"/>
+            <a:ext cx="5375564" cy="4948518"/>
           </a:xfrm>
           <a:prstGeom prst="rect">
             <a:avLst/>
@@ -2854,7 +2888,7 @@
           <a:lstStyle/>
           <a:p>
             <a:pPr algn="ctr"/>
-            <a:endParaRPr lang="en-US"/>
+            <a:endParaRPr lang="en-US" sz="36487"/>
           </a:p>
         </p:txBody>
       </p:sp>
@@ -2866,8 +2900,8 @@
         </p:nvSpPr>
         <p:spPr bwMode="auto">
           <a:xfrm>
-            <a:off x="214313" y="222250"/>
-            <a:ext cx="139701" cy="393700"/>
+            <a:off x="935186" y="941294"/>
+            <a:ext cx="609604" cy="1667435"/>
           </a:xfrm>
           <a:prstGeom prst="rect">
             <a:avLst/>
@@ -2885,14 +2919,14 @@
           <a:effectLst/>
         </p:spPr>
         <p:txBody>
-          <a:bodyPr vert="horz" wrap="square" lIns="91440" tIns="45720" rIns="91440" bIns="45720" numCol="1" rtlCol="0" anchor="t" anchorCtr="0" compatLnSpc="1">
+          <a:bodyPr vert="horz" wrap="square" lIns="387275" tIns="193638" rIns="387275" bIns="193638" numCol="1" rtlCol="0" anchor="t" anchorCtr="0" compatLnSpc="1">
             <a:prstTxWarp prst="textNoShape">
               <a:avLst/>
             </a:prstTxWarp>
           </a:bodyPr>
           <a:lstStyle/>
           <a:p>
-            <a:pPr marL="0" marR="0" indent="0" algn="l" defTabSz="914400" rtl="0" eaLnBrk="0" fontAlgn="base" latinLnBrk="0" hangingPunct="0">
+            <a:pPr marL="0" marR="0" indent="0" algn="l" defTabSz="3872758" rtl="0" eaLnBrk="0" fontAlgn="base" latinLnBrk="0" hangingPunct="0">
               <a:lnSpc>
                 <a:spcPct val="100000"/>
               </a:lnSpc>
@@ -2908,7 +2942,7 @@
               <a:buNone/>
               <a:tabLst/>
             </a:pPr>
-            <a:endParaRPr kumimoji="0" lang="en-US" sz="2400" b="0" i="0" u="none" strike="noStrike" cap="none" normalizeH="0" baseline="0">
+            <a:endParaRPr kumimoji="0" lang="en-US" sz="10165" b="0" i="0" u="none" strike="noStrike" cap="none" normalizeH="0" baseline="0">
               <a:ln>
                 <a:noFill/>
               </a:ln>
@@ -2930,8 +2964,8 @@
         </p:nvSpPr>
         <p:spPr bwMode="auto">
           <a:xfrm>
-            <a:off x="354014" y="222250"/>
-            <a:ext cx="2959099" cy="393700"/>
+            <a:off x="1544791" y="941294"/>
+            <a:ext cx="12912432" cy="1667435"/>
           </a:xfrm>
           <a:prstGeom prst="rect">
             <a:avLst/>
@@ -2949,14 +2983,14 @@
           <a:effectLst/>
         </p:spPr>
         <p:txBody>
-          <a:bodyPr vert="horz" wrap="square" lIns="91440" tIns="45720" rIns="91440" bIns="45720" numCol="1" rtlCol="0" anchor="t" anchorCtr="0" compatLnSpc="1">
+          <a:bodyPr vert="horz" wrap="square" lIns="387275" tIns="193638" rIns="387275" bIns="193638" numCol="1" rtlCol="0" anchor="t" anchorCtr="0" compatLnSpc="1">
             <a:prstTxWarp prst="textNoShape">
               <a:avLst/>
             </a:prstTxWarp>
           </a:bodyPr>
           <a:lstStyle/>
           <a:p>
-            <a:pPr marL="0" marR="0" indent="0" algn="l" defTabSz="914400" rtl="0" eaLnBrk="0" fontAlgn="base" latinLnBrk="0" hangingPunct="0">
+            <a:pPr marL="0" marR="0" indent="0" algn="l" defTabSz="3872758" rtl="0" eaLnBrk="0" fontAlgn="base" latinLnBrk="0" hangingPunct="0">
               <a:lnSpc>
                 <a:spcPct val="100000"/>
               </a:lnSpc>
@@ -2972,7 +3006,7 @@
               <a:buNone/>
               <a:tabLst/>
             </a:pPr>
-            <a:endParaRPr kumimoji="0" lang="en-US" sz="2400" b="0" i="0" u="none" strike="noStrike" cap="none" normalizeH="0" baseline="0">
+            <a:endParaRPr kumimoji="0" lang="en-US" sz="10165" b="0" i="0" u="none" strike="noStrike" cap="none" normalizeH="0" baseline="0">
               <a:ln>
                 <a:noFill/>
               </a:ln>
@@ -2994,8 +3028,8 @@
         </p:nvSpPr>
         <p:spPr bwMode="auto">
           <a:xfrm>
-            <a:off x="3313113" y="222250"/>
-            <a:ext cx="630237" cy="393700"/>
+            <a:off x="14457223" y="941294"/>
+            <a:ext cx="2750125" cy="1667435"/>
           </a:xfrm>
           <a:prstGeom prst="rect">
             <a:avLst/>
@@ -3013,14 +3047,14 @@
           <a:effectLst/>
         </p:spPr>
         <p:txBody>
-          <a:bodyPr vert="horz" wrap="square" lIns="91440" tIns="45720" rIns="91440" bIns="45720" numCol="1" rtlCol="0" anchor="t" anchorCtr="0" compatLnSpc="1">
+          <a:bodyPr vert="horz" wrap="square" lIns="387275" tIns="193638" rIns="387275" bIns="193638" numCol="1" rtlCol="0" anchor="t" anchorCtr="0" compatLnSpc="1">
             <a:prstTxWarp prst="textNoShape">
               <a:avLst/>
             </a:prstTxWarp>
           </a:bodyPr>
           <a:lstStyle/>
           <a:p>
-            <a:pPr marL="0" marR="0" indent="0" algn="l" defTabSz="914400" rtl="0" eaLnBrk="0" fontAlgn="base" latinLnBrk="0" hangingPunct="0">
+            <a:pPr marL="0" marR="0" indent="0" algn="l" defTabSz="3872758" rtl="0" eaLnBrk="0" fontAlgn="base" latinLnBrk="0" hangingPunct="0">
               <a:lnSpc>
                 <a:spcPct val="100000"/>
               </a:lnSpc>
@@ -3036,7 +3070,7 @@
               <a:buNone/>
               <a:tabLst/>
             </a:pPr>
-            <a:endParaRPr kumimoji="0" lang="en-US" sz="2400" b="0" i="0" u="none" strike="noStrike" cap="none" normalizeH="0" baseline="0">
+            <a:endParaRPr kumimoji="0" lang="en-US" sz="10165" b="0" i="0" u="none" strike="noStrike" cap="none" normalizeH="0" baseline="0">
               <a:ln>
                 <a:noFill/>
               </a:ln>
@@ -3058,8 +3092,8 @@
         </p:nvSpPr>
         <p:spPr bwMode="auto">
           <a:xfrm>
-            <a:off x="3943350" y="222250"/>
-            <a:ext cx="5886450" cy="393700"/>
+            <a:off x="17207346" y="941294"/>
+            <a:ext cx="25686327" cy="1667435"/>
           </a:xfrm>
           <a:prstGeom prst="rect">
             <a:avLst/>
@@ -3077,14 +3111,14 @@
           <a:effectLst/>
         </p:spPr>
         <p:txBody>
-          <a:bodyPr vert="horz" wrap="square" lIns="91440" tIns="45720" rIns="91440" bIns="45720" numCol="1" rtlCol="0" anchor="t" anchorCtr="0" compatLnSpc="1">
+          <a:bodyPr vert="horz" wrap="square" lIns="387275" tIns="193638" rIns="387275" bIns="193638" numCol="1" rtlCol="0" anchor="t" anchorCtr="0" compatLnSpc="1">
             <a:prstTxWarp prst="textNoShape">
               <a:avLst/>
             </a:prstTxWarp>
           </a:bodyPr>
           <a:lstStyle/>
           <a:p>
-            <a:pPr marL="0" marR="0" indent="0" algn="l" defTabSz="914400" rtl="0" eaLnBrk="0" fontAlgn="base" latinLnBrk="0" hangingPunct="0">
+            <a:pPr marL="0" marR="0" indent="0" algn="l" defTabSz="3872758" rtl="0" eaLnBrk="0" fontAlgn="base" latinLnBrk="0" hangingPunct="0">
               <a:lnSpc>
                 <a:spcPct val="100000"/>
               </a:lnSpc>
@@ -3101,7 +3135,7 @@
               <a:tabLst/>
             </a:pPr>
             <a:r>
-              <a:rPr kumimoji="0" lang="en-US" sz="2400" b="0" i="0" u="none" strike="noStrike" cap="none" normalizeH="0" baseline="0" dirty="0">
+              <a:rPr kumimoji="0" lang="en-US" sz="10165" b="0" i="0" u="none" strike="noStrike" cap="none" normalizeH="0" baseline="0" dirty="0">
                 <a:ln>
                   <a:noFill/>
                 </a:ln>
@@ -3125,21 +3159,21 @@
         </p:nvSpPr>
         <p:spPr>
           <a:xfrm>
-            <a:off x="354014" y="292099"/>
-            <a:ext cx="2959099" cy="285750"/>
-          </a:xfrm>
-          <a:prstGeom prst="rect">
-            <a:avLst/>
-          </a:prstGeom>
-        </p:spPr>
-        <p:txBody>
-          <a:bodyPr vert="horz" wrap="none" lIns="101870" tIns="50935" rIns="101870" bIns="50935" rtlCol="0" anchor="ctr" anchorCtr="0">
+            <a:off x="1544791" y="1237125"/>
+            <a:ext cx="12912432" cy="1210235"/>
+          </a:xfrm>
+          <a:prstGeom prst="rect">
+            <a:avLst/>
+          </a:prstGeom>
+        </p:spPr>
+        <p:txBody>
+          <a:bodyPr vert="horz" wrap="none" lIns="431449" tIns="215725" rIns="431449" bIns="215725" rtlCol="0" anchor="ctr" anchorCtr="0">
             <a:noAutofit/>
           </a:bodyPr>
           <a:lstStyle/>
           <a:p>
             <a:r>
-              <a:rPr lang="en-US" sz="800" baseline="0" dirty="0">
+              <a:rPr lang="en-US" sz="3388" baseline="0" dirty="0">
                 <a:solidFill>
                   <a:schemeClr val="bg1"/>
                 </a:solidFill>
@@ -3188,8 +3222,8 @@
         </p:nvSpPr>
         <p:spPr>
           <a:xfrm>
-            <a:off x="214313" y="812800"/>
-            <a:ext cx="3003550" cy="2336800"/>
+            <a:off x="935184" y="3442447"/>
+            <a:ext cx="13106400" cy="9897035"/>
           </a:xfrm>
           <a:prstGeom prst="rect">
             <a:avLst/>
@@ -3221,7 +3255,7 @@
           <a:lstStyle/>
           <a:p>
             <a:pPr algn="ctr"/>
-            <a:endParaRPr lang="en-US"/>
+            <a:endParaRPr lang="en-US" sz="36487"/>
           </a:p>
         </p:txBody>
       </p:sp>
@@ -3233,8 +3267,8 @@
         </p:nvSpPr>
         <p:spPr>
           <a:xfrm>
-            <a:off x="3529012" y="5200650"/>
-            <a:ext cx="6288087" cy="2336800"/>
+            <a:off x="15399327" y="22026283"/>
+            <a:ext cx="27438925" cy="9897035"/>
           </a:xfrm>
           <a:prstGeom prst="rect">
             <a:avLst/>
@@ -3266,7 +3300,7 @@
           <a:lstStyle/>
           <a:p>
             <a:pPr algn="ctr"/>
-            <a:endParaRPr lang="en-US"/>
+            <a:endParaRPr lang="en-US" sz="36487"/>
           </a:p>
         </p:txBody>
       </p:sp>
@@ -3282,8 +3316,8 @@
         </p:nvSpPr>
         <p:spPr>
           <a:xfrm>
-            <a:off x="374333" y="3435456"/>
-            <a:ext cx="2729230" cy="4101994"/>
+            <a:off x="1633453" y="14550167"/>
+            <a:ext cx="11909367" cy="17373151"/>
           </a:xfrm>
         </p:spPr>
         <p:txBody>
@@ -3292,7 +3326,7 @@
           </a:bodyPr>
           <a:lstStyle>
             <a:lvl1pPr algn="l">
-              <a:defRPr sz="1000" b="0" i="0">
+              <a:defRPr sz="4235" b="0" i="0">
                 <a:latin typeface="LeituraSans-Grot 1"/>
                 <a:cs typeface="LeituraSans-Grot 1"/>
               </a:defRPr>
@@ -3318,8 +3352,8 @@
         </p:nvSpPr>
         <p:spPr>
           <a:xfrm>
-            <a:off x="6927850" y="812800"/>
-            <a:ext cx="2749550" cy="4114800"/>
+            <a:off x="30230618" y="3442447"/>
+            <a:ext cx="11998036" cy="17427388"/>
           </a:xfrm>
         </p:spPr>
         <p:txBody>
@@ -3333,7 +3367,7 @@
               </a:spcBef>
               <a:buFontTx/>
               <a:buNone/>
-              <a:defRPr sz="1000">
+              <a:defRPr sz="4235">
                 <a:latin typeface="LeituraSans-Grot 1"/>
               </a:defRPr>
             </a:lvl1pPr>
@@ -3341,7 +3375,7 @@
               <a:spcBef>
                 <a:spcPts val="0"/>
               </a:spcBef>
-              <a:defRPr sz="1000">
+              <a:defRPr sz="4235">
                 <a:latin typeface="LeituraSans-Grot 1"/>
               </a:defRPr>
             </a:lvl2pPr>
@@ -3349,7 +3383,7 @@
               <a:spcBef>
                 <a:spcPts val="0"/>
               </a:spcBef>
-              <a:defRPr sz="1000">
+              <a:defRPr sz="4235">
                 <a:latin typeface="LeituraSans-Grot 1"/>
               </a:defRPr>
             </a:lvl3pPr>
@@ -3357,7 +3391,7 @@
               <a:spcBef>
                 <a:spcPts val="0"/>
               </a:spcBef>
-              <a:defRPr sz="1000">
+              <a:defRPr sz="4235">
                 <a:latin typeface="LeituraSans-Grot 1"/>
               </a:defRPr>
             </a:lvl4pPr>
@@ -3365,7 +3399,7 @@
               <a:spcBef>
                 <a:spcPts val="0"/>
               </a:spcBef>
-              <a:defRPr sz="1000">
+              <a:defRPr sz="4235">
                 <a:latin typeface="LeituraSans-Grot 1"/>
               </a:defRPr>
             </a:lvl5pPr>
@@ -3391,8 +3425,8 @@
         </p:nvSpPr>
         <p:spPr>
           <a:xfrm>
-            <a:off x="3529012" y="812800"/>
-            <a:ext cx="2973388" cy="4114800"/>
+            <a:off x="15399325" y="3442447"/>
+            <a:ext cx="12974784" cy="17427388"/>
           </a:xfrm>
         </p:spPr>
         <p:txBody>
@@ -3406,7 +3440,7 @@
               </a:spcBef>
               <a:buFontTx/>
               <a:buNone/>
-              <a:defRPr sz="1000">
+              <a:defRPr sz="4235">
                 <a:latin typeface="LeituraSans-Grot 1"/>
               </a:defRPr>
             </a:lvl1pPr>
@@ -3414,7 +3448,7 @@
               <a:spcBef>
                 <a:spcPts val="0"/>
               </a:spcBef>
-              <a:defRPr sz="1000">
+              <a:defRPr sz="4235">
                 <a:latin typeface="LeituraSans-Grot 1"/>
               </a:defRPr>
             </a:lvl2pPr>
@@ -3422,7 +3456,7 @@
               <a:spcBef>
                 <a:spcPts val="0"/>
               </a:spcBef>
-              <a:defRPr sz="1000">
+              <a:defRPr sz="4235">
                 <a:latin typeface="LeituraSans-Grot 1"/>
               </a:defRPr>
             </a:lvl3pPr>
@@ -3430,7 +3464,7 @@
               <a:spcBef>
                 <a:spcPts val="0"/>
               </a:spcBef>
-              <a:defRPr sz="1000">
+              <a:defRPr sz="4235">
                 <a:latin typeface="LeituraSans-Grot 1"/>
               </a:defRPr>
             </a:lvl4pPr>
@@ -3438,7 +3472,7 @@
               <a:spcBef>
                 <a:spcPts val="0"/>
               </a:spcBef>
-              <a:defRPr sz="1000">
+              <a:defRPr sz="4235">
                 <a:latin typeface="LeituraSans-Grot 1"/>
               </a:defRPr>
             </a:lvl5pPr>
@@ -3460,8 +3494,8 @@
         </p:nvSpPr>
         <p:spPr bwMode="auto">
           <a:xfrm>
-            <a:off x="214313" y="222250"/>
-            <a:ext cx="139701" cy="393700"/>
+            <a:off x="935186" y="941294"/>
+            <a:ext cx="609604" cy="1667435"/>
           </a:xfrm>
           <a:prstGeom prst="rect">
             <a:avLst/>
@@ -3479,14 +3513,14 @@
           <a:effectLst/>
         </p:spPr>
         <p:txBody>
-          <a:bodyPr vert="horz" wrap="square" lIns="91440" tIns="45720" rIns="91440" bIns="45720" numCol="1" rtlCol="0" anchor="t" anchorCtr="0" compatLnSpc="1">
+          <a:bodyPr vert="horz" wrap="square" lIns="387275" tIns="193638" rIns="387275" bIns="193638" numCol="1" rtlCol="0" anchor="t" anchorCtr="0" compatLnSpc="1">
             <a:prstTxWarp prst="textNoShape">
               <a:avLst/>
             </a:prstTxWarp>
           </a:bodyPr>
           <a:lstStyle/>
           <a:p>
-            <a:pPr marL="0" marR="0" indent="0" algn="l" defTabSz="914400" rtl="0" eaLnBrk="0" fontAlgn="base" latinLnBrk="0" hangingPunct="0">
+            <a:pPr marL="0" marR="0" indent="0" algn="l" defTabSz="3872758" rtl="0" eaLnBrk="0" fontAlgn="base" latinLnBrk="0" hangingPunct="0">
               <a:lnSpc>
                 <a:spcPct val="100000"/>
               </a:lnSpc>
@@ -3502,7 +3536,7 @@
               <a:buNone/>
               <a:tabLst/>
             </a:pPr>
-            <a:endParaRPr kumimoji="0" lang="en-US" sz="2400" b="0" i="0" u="none" strike="noStrike" cap="none" normalizeH="0" baseline="0">
+            <a:endParaRPr kumimoji="0" lang="en-US" sz="10165" b="0" i="0" u="none" strike="noStrike" cap="none" normalizeH="0" baseline="0">
               <a:ln>
                 <a:noFill/>
               </a:ln>
@@ -3524,8 +3558,8 @@
         </p:nvSpPr>
         <p:spPr bwMode="auto">
           <a:xfrm>
-            <a:off x="354014" y="222250"/>
-            <a:ext cx="2959099" cy="393700"/>
+            <a:off x="1544791" y="941294"/>
+            <a:ext cx="12912432" cy="1667435"/>
           </a:xfrm>
           <a:prstGeom prst="rect">
             <a:avLst/>
@@ -3543,14 +3577,14 @@
           <a:effectLst/>
         </p:spPr>
         <p:txBody>
-          <a:bodyPr vert="horz" wrap="square" lIns="91440" tIns="45720" rIns="91440" bIns="45720" numCol="1" rtlCol="0" anchor="t" anchorCtr="0" compatLnSpc="1">
+          <a:bodyPr vert="horz" wrap="square" lIns="387275" tIns="193638" rIns="387275" bIns="193638" numCol="1" rtlCol="0" anchor="t" anchorCtr="0" compatLnSpc="1">
             <a:prstTxWarp prst="textNoShape">
               <a:avLst/>
             </a:prstTxWarp>
           </a:bodyPr>
           <a:lstStyle/>
           <a:p>
-            <a:pPr marL="0" marR="0" indent="0" algn="l" defTabSz="914400" rtl="0" eaLnBrk="0" fontAlgn="base" latinLnBrk="0" hangingPunct="0">
+            <a:pPr marL="0" marR="0" indent="0" algn="l" defTabSz="3872758" rtl="0" eaLnBrk="0" fontAlgn="base" latinLnBrk="0" hangingPunct="0">
               <a:lnSpc>
                 <a:spcPct val="100000"/>
               </a:lnSpc>
@@ -3566,7 +3600,7 @@
               <a:buNone/>
               <a:tabLst/>
             </a:pPr>
-            <a:endParaRPr kumimoji="0" lang="en-US" sz="2400" b="0" i="0" u="none" strike="noStrike" cap="none" normalizeH="0" baseline="0">
+            <a:endParaRPr kumimoji="0" lang="en-US" sz="10165" b="0" i="0" u="none" strike="noStrike" cap="none" normalizeH="0" baseline="0">
               <a:ln>
                 <a:noFill/>
               </a:ln>
@@ -3588,8 +3622,8 @@
         </p:nvSpPr>
         <p:spPr bwMode="auto">
           <a:xfrm>
-            <a:off x="3313113" y="222250"/>
-            <a:ext cx="630237" cy="393700"/>
+            <a:off x="14457223" y="941294"/>
+            <a:ext cx="2750125" cy="1667435"/>
           </a:xfrm>
           <a:prstGeom prst="rect">
             <a:avLst/>
@@ -3607,14 +3641,14 @@
           <a:effectLst/>
         </p:spPr>
         <p:txBody>
-          <a:bodyPr vert="horz" wrap="square" lIns="91440" tIns="45720" rIns="91440" bIns="45720" numCol="1" rtlCol="0" anchor="t" anchorCtr="0" compatLnSpc="1">
+          <a:bodyPr vert="horz" wrap="square" lIns="387275" tIns="193638" rIns="387275" bIns="193638" numCol="1" rtlCol="0" anchor="t" anchorCtr="0" compatLnSpc="1">
             <a:prstTxWarp prst="textNoShape">
               <a:avLst/>
             </a:prstTxWarp>
           </a:bodyPr>
           <a:lstStyle/>
           <a:p>
-            <a:pPr marL="0" marR="0" indent="0" algn="l" defTabSz="914400" rtl="0" eaLnBrk="0" fontAlgn="base" latinLnBrk="0" hangingPunct="0">
+            <a:pPr marL="0" marR="0" indent="0" algn="l" defTabSz="3872758" rtl="0" eaLnBrk="0" fontAlgn="base" latinLnBrk="0" hangingPunct="0">
               <a:lnSpc>
                 <a:spcPct val="100000"/>
               </a:lnSpc>
@@ -3630,7 +3664,7 @@
               <a:buNone/>
               <a:tabLst/>
             </a:pPr>
-            <a:endParaRPr kumimoji="0" lang="en-US" sz="2400" b="0" i="0" u="none" strike="noStrike" cap="none" normalizeH="0" baseline="0">
+            <a:endParaRPr kumimoji="0" lang="en-US" sz="10165" b="0" i="0" u="none" strike="noStrike" cap="none" normalizeH="0" baseline="0">
               <a:ln>
                 <a:noFill/>
               </a:ln>
@@ -3652,8 +3686,8 @@
         </p:nvSpPr>
         <p:spPr bwMode="auto">
           <a:xfrm>
-            <a:off x="3943350" y="222250"/>
-            <a:ext cx="5886450" cy="393700"/>
+            <a:off x="17207346" y="941294"/>
+            <a:ext cx="25686327" cy="1667435"/>
           </a:xfrm>
           <a:prstGeom prst="rect">
             <a:avLst/>
@@ -3671,14 +3705,14 @@
           <a:effectLst/>
         </p:spPr>
         <p:txBody>
-          <a:bodyPr vert="horz" wrap="square" lIns="91440" tIns="45720" rIns="91440" bIns="45720" numCol="1" rtlCol="0" anchor="t" anchorCtr="0" compatLnSpc="1">
+          <a:bodyPr vert="horz" wrap="square" lIns="387275" tIns="193638" rIns="387275" bIns="193638" numCol="1" rtlCol="0" anchor="t" anchorCtr="0" compatLnSpc="1">
             <a:prstTxWarp prst="textNoShape">
               <a:avLst/>
             </a:prstTxWarp>
           </a:bodyPr>
           <a:lstStyle/>
           <a:p>
-            <a:pPr marL="0" marR="0" indent="0" algn="l" defTabSz="914400" rtl="0" eaLnBrk="0" fontAlgn="base" latinLnBrk="0" hangingPunct="0">
+            <a:pPr marL="0" marR="0" indent="0" algn="l" defTabSz="3872758" rtl="0" eaLnBrk="0" fontAlgn="base" latinLnBrk="0" hangingPunct="0">
               <a:lnSpc>
                 <a:spcPct val="100000"/>
               </a:lnSpc>
@@ -3695,7 +3729,7 @@
               <a:tabLst/>
             </a:pPr>
             <a:r>
-              <a:rPr kumimoji="0" lang="en-US" sz="2400" b="0" i="0" u="none" strike="noStrike" cap="none" normalizeH="0" baseline="0" dirty="0">
+              <a:rPr kumimoji="0" lang="en-US" sz="10165" b="0" i="0" u="none" strike="noStrike" cap="none" normalizeH="0" baseline="0" dirty="0">
                 <a:ln>
                   <a:noFill/>
                 </a:ln>
@@ -3719,21 +3753,21 @@
         </p:nvSpPr>
         <p:spPr>
           <a:xfrm>
-            <a:off x="354014" y="292099"/>
-            <a:ext cx="2959099" cy="285750"/>
-          </a:xfrm>
-          <a:prstGeom prst="rect">
-            <a:avLst/>
-          </a:prstGeom>
-        </p:spPr>
-        <p:txBody>
-          <a:bodyPr vert="horz" wrap="none" lIns="101870" tIns="50935" rIns="101870" bIns="50935" rtlCol="0" anchor="ctr" anchorCtr="0">
+            <a:off x="1544791" y="1237125"/>
+            <a:ext cx="12912432" cy="1210235"/>
+          </a:xfrm>
+          <a:prstGeom prst="rect">
+            <a:avLst/>
+          </a:prstGeom>
+        </p:spPr>
+        <p:txBody>
+          <a:bodyPr vert="horz" wrap="none" lIns="431449" tIns="215725" rIns="431449" bIns="215725" rtlCol="0" anchor="ctr" anchorCtr="0">
             <a:noAutofit/>
           </a:bodyPr>
           <a:lstStyle/>
           <a:p>
             <a:r>
-              <a:rPr lang="en-US" sz="800" baseline="0" dirty="0">
+              <a:rPr lang="en-US" sz="3388" baseline="0" dirty="0">
                 <a:solidFill>
                   <a:schemeClr val="bg1"/>
                 </a:solidFill>
@@ -3782,8 +3816,8 @@
         </p:nvSpPr>
         <p:spPr bwMode="auto">
           <a:xfrm>
-            <a:off x="214313" y="222250"/>
-            <a:ext cx="139701" cy="393700"/>
+            <a:off x="935186" y="941294"/>
+            <a:ext cx="609604" cy="1667435"/>
           </a:xfrm>
           <a:prstGeom prst="rect">
             <a:avLst/>
@@ -3801,14 +3835,14 @@
           <a:effectLst/>
         </p:spPr>
         <p:txBody>
-          <a:bodyPr vert="horz" wrap="square" lIns="91440" tIns="45720" rIns="91440" bIns="45720" numCol="1" rtlCol="0" anchor="t" anchorCtr="0" compatLnSpc="1">
+          <a:bodyPr vert="horz" wrap="square" lIns="387275" tIns="193638" rIns="387275" bIns="193638" numCol="1" rtlCol="0" anchor="t" anchorCtr="0" compatLnSpc="1">
             <a:prstTxWarp prst="textNoShape">
               <a:avLst/>
             </a:prstTxWarp>
           </a:bodyPr>
           <a:lstStyle/>
           <a:p>
-            <a:pPr marL="0" marR="0" indent="0" algn="l" defTabSz="914400" rtl="0" eaLnBrk="0" fontAlgn="base" latinLnBrk="0" hangingPunct="0">
+            <a:pPr marL="0" marR="0" indent="0" algn="l" defTabSz="3872758" rtl="0" eaLnBrk="0" fontAlgn="base" latinLnBrk="0" hangingPunct="0">
               <a:lnSpc>
                 <a:spcPct val="100000"/>
               </a:lnSpc>
@@ -3824,7 +3858,7 @@
               <a:buNone/>
               <a:tabLst/>
             </a:pPr>
-            <a:endParaRPr kumimoji="0" lang="en-US" sz="2400" b="0" i="0" u="none" strike="noStrike" cap="none" normalizeH="0" baseline="0">
+            <a:endParaRPr kumimoji="0" lang="en-US" sz="10165" b="0" i="0" u="none" strike="noStrike" cap="none" normalizeH="0" baseline="0">
               <a:ln>
                 <a:noFill/>
               </a:ln>
@@ -3846,8 +3880,8 @@
         </p:nvSpPr>
         <p:spPr bwMode="auto">
           <a:xfrm>
-            <a:off x="354014" y="222250"/>
-            <a:ext cx="2959099" cy="393700"/>
+            <a:off x="1544791" y="941294"/>
+            <a:ext cx="12912432" cy="1667435"/>
           </a:xfrm>
           <a:prstGeom prst="rect">
             <a:avLst/>
@@ -3865,14 +3899,14 @@
           <a:effectLst/>
         </p:spPr>
         <p:txBody>
-          <a:bodyPr vert="horz" wrap="square" lIns="91440" tIns="45720" rIns="91440" bIns="45720" numCol="1" rtlCol="0" anchor="t" anchorCtr="0" compatLnSpc="1">
+          <a:bodyPr vert="horz" wrap="square" lIns="387275" tIns="193638" rIns="387275" bIns="193638" numCol="1" rtlCol="0" anchor="t" anchorCtr="0" compatLnSpc="1">
             <a:prstTxWarp prst="textNoShape">
               <a:avLst/>
             </a:prstTxWarp>
           </a:bodyPr>
           <a:lstStyle/>
           <a:p>
-            <a:pPr marL="0" marR="0" indent="0" algn="l" defTabSz="914400" rtl="0" eaLnBrk="0" fontAlgn="base" latinLnBrk="0" hangingPunct="0">
+            <a:pPr marL="0" marR="0" indent="0" algn="l" defTabSz="3872758" rtl="0" eaLnBrk="0" fontAlgn="base" latinLnBrk="0" hangingPunct="0">
               <a:lnSpc>
                 <a:spcPct val="100000"/>
               </a:lnSpc>
@@ -3888,7 +3922,7 @@
               <a:buNone/>
               <a:tabLst/>
             </a:pPr>
-            <a:endParaRPr kumimoji="0" lang="en-US" sz="2400" b="0" i="0" u="none" strike="noStrike" cap="none" normalizeH="0" baseline="0">
+            <a:endParaRPr kumimoji="0" lang="en-US" sz="10165" b="0" i="0" u="none" strike="noStrike" cap="none" normalizeH="0" baseline="0">
               <a:ln>
                 <a:noFill/>
               </a:ln>
@@ -3910,8 +3944,8 @@
         </p:nvSpPr>
         <p:spPr bwMode="auto">
           <a:xfrm>
-            <a:off x="3313113" y="222250"/>
-            <a:ext cx="630237" cy="393700"/>
+            <a:off x="14457223" y="941294"/>
+            <a:ext cx="2750125" cy="1667435"/>
           </a:xfrm>
           <a:prstGeom prst="rect">
             <a:avLst/>
@@ -3929,14 +3963,14 @@
           <a:effectLst/>
         </p:spPr>
         <p:txBody>
-          <a:bodyPr vert="horz" wrap="square" lIns="91440" tIns="45720" rIns="91440" bIns="45720" numCol="1" rtlCol="0" anchor="t" anchorCtr="0" compatLnSpc="1">
+          <a:bodyPr vert="horz" wrap="square" lIns="387275" tIns="193638" rIns="387275" bIns="193638" numCol="1" rtlCol="0" anchor="t" anchorCtr="0" compatLnSpc="1">
             <a:prstTxWarp prst="textNoShape">
               <a:avLst/>
             </a:prstTxWarp>
           </a:bodyPr>
           <a:lstStyle/>
           <a:p>
-            <a:pPr marL="0" marR="0" indent="0" algn="l" defTabSz="914400" rtl="0" eaLnBrk="0" fontAlgn="base" latinLnBrk="0" hangingPunct="0">
+            <a:pPr marL="0" marR="0" indent="0" algn="l" defTabSz="3872758" rtl="0" eaLnBrk="0" fontAlgn="base" latinLnBrk="0" hangingPunct="0">
               <a:lnSpc>
                 <a:spcPct val="100000"/>
               </a:lnSpc>
@@ -3952,7 +3986,7 @@
               <a:buNone/>
               <a:tabLst/>
             </a:pPr>
-            <a:endParaRPr kumimoji="0" lang="en-US" sz="2400" b="0" i="0" u="none" strike="noStrike" cap="none" normalizeH="0" baseline="0">
+            <a:endParaRPr kumimoji="0" lang="en-US" sz="10165" b="0" i="0" u="none" strike="noStrike" cap="none" normalizeH="0" baseline="0">
               <a:ln>
                 <a:noFill/>
               </a:ln>
@@ -3974,8 +4008,8 @@
         </p:nvSpPr>
         <p:spPr bwMode="auto">
           <a:xfrm>
-            <a:off x="3943350" y="222250"/>
-            <a:ext cx="5886450" cy="393700"/>
+            <a:off x="17207346" y="941294"/>
+            <a:ext cx="25686327" cy="1667435"/>
           </a:xfrm>
           <a:prstGeom prst="rect">
             <a:avLst/>
@@ -3993,14 +4027,14 @@
           <a:effectLst/>
         </p:spPr>
         <p:txBody>
-          <a:bodyPr vert="horz" wrap="square" lIns="91440" tIns="45720" rIns="91440" bIns="45720" numCol="1" rtlCol="0" anchor="t" anchorCtr="0" compatLnSpc="1">
+          <a:bodyPr vert="horz" wrap="square" lIns="387275" tIns="193638" rIns="387275" bIns="193638" numCol="1" rtlCol="0" anchor="t" anchorCtr="0" compatLnSpc="1">
             <a:prstTxWarp prst="textNoShape">
               <a:avLst/>
             </a:prstTxWarp>
           </a:bodyPr>
           <a:lstStyle/>
           <a:p>
-            <a:pPr marL="0" marR="0" indent="0" algn="l" defTabSz="914400" rtl="0" eaLnBrk="0" fontAlgn="base" latinLnBrk="0" hangingPunct="0">
+            <a:pPr marL="0" marR="0" indent="0" algn="l" defTabSz="3872758" rtl="0" eaLnBrk="0" fontAlgn="base" latinLnBrk="0" hangingPunct="0">
               <a:lnSpc>
                 <a:spcPct val="100000"/>
               </a:lnSpc>
@@ -4017,7 +4051,7 @@
               <a:tabLst/>
             </a:pPr>
             <a:r>
-              <a:rPr kumimoji="0" lang="en-US" sz="2400" b="0" i="0" u="none" strike="noStrike" cap="none" normalizeH="0" baseline="0" dirty="0">
+              <a:rPr kumimoji="0" lang="en-US" sz="10165" b="0" i="0" u="none" strike="noStrike" cap="none" normalizeH="0" baseline="0" dirty="0">
                 <a:ln>
                   <a:noFill/>
                 </a:ln>
@@ -4041,21 +4075,21 @@
         </p:nvSpPr>
         <p:spPr>
           <a:xfrm>
-            <a:off x="354014" y="292099"/>
-            <a:ext cx="2959099" cy="285750"/>
-          </a:xfrm>
-          <a:prstGeom prst="rect">
-            <a:avLst/>
-          </a:prstGeom>
-        </p:spPr>
-        <p:txBody>
-          <a:bodyPr vert="horz" wrap="none" lIns="101870" tIns="50935" rIns="101870" bIns="50935" rtlCol="0" anchor="ctr" anchorCtr="0">
+            <a:off x="1544791" y="1237125"/>
+            <a:ext cx="12912432" cy="1210235"/>
+          </a:xfrm>
+          <a:prstGeom prst="rect">
+            <a:avLst/>
+          </a:prstGeom>
+        </p:spPr>
+        <p:txBody>
+          <a:bodyPr vert="horz" wrap="none" lIns="431449" tIns="215725" rIns="431449" bIns="215725" rtlCol="0" anchor="ctr" anchorCtr="0">
             <a:noAutofit/>
           </a:bodyPr>
           <a:lstStyle/>
           <a:p>
             <a:r>
-              <a:rPr lang="en-US" sz="800" baseline="0" dirty="0">
+              <a:rPr lang="en-US" sz="3388" baseline="0" dirty="0">
                 <a:solidFill>
                   <a:schemeClr val="bg1"/>
                 </a:solidFill>
@@ -4113,8 +4147,8 @@
         </p:nvSpPr>
         <p:spPr>
           <a:xfrm>
-            <a:off x="502920" y="311256"/>
-            <a:ext cx="9052560" cy="1295400"/>
+            <a:off x="2194560" y="1318261"/>
+            <a:ext cx="39502080" cy="5486400"/>
           </a:xfrm>
           <a:prstGeom prst="rect">
             <a:avLst/>
@@ -4145,8 +4179,8 @@
         </p:nvSpPr>
         <p:spPr>
           <a:xfrm>
-            <a:off x="502920" y="1813562"/>
-            <a:ext cx="9052560" cy="5129425"/>
+            <a:off x="2194560" y="7680970"/>
+            <a:ext cx="39502080" cy="21724624"/>
           </a:xfrm>
           <a:prstGeom prst="rect">
             <a:avLst/>
@@ -4206,8 +4240,8 @@
         </p:nvSpPr>
         <p:spPr>
           <a:xfrm>
-            <a:off x="502920" y="7203864"/>
-            <a:ext cx="2346960" cy="413808"/>
+            <a:off x="2194560" y="30510483"/>
+            <a:ext cx="10241280" cy="1752599"/>
           </a:xfrm>
           <a:prstGeom prst="rect">
             <a:avLst/>
@@ -4217,7 +4251,7 @@
           <a:bodyPr vert="horz" lIns="101870" tIns="50935" rIns="101870" bIns="50935" rtlCol="0" anchor="ctr"/>
           <a:lstStyle>
             <a:lvl1pPr algn="l">
-              <a:defRPr sz="1300">
+              <a:defRPr sz="5506">
                 <a:solidFill>
                   <a:schemeClr val="tx1">
                     <a:tint val="75000"/>
@@ -4229,7 +4263,7 @@
           <a:p>
             <a:fld id="{F9ECB4D6-8F62-1347-AB55-75A32D414E6D}" type="datetimeFigureOut">
               <a:rPr lang="en-US" smtClean="0"/>
-              <a:t>10/5/2016</a:t>
+              <a:t>10/6/2016</a:t>
             </a:fld>
             <a:endParaRPr lang="en-US"/>
           </a:p>
@@ -4247,8 +4281,8 @@
         </p:nvSpPr>
         <p:spPr>
           <a:xfrm>
-            <a:off x="3436620" y="7203864"/>
-            <a:ext cx="3185160" cy="413808"/>
+            <a:off x="14996160" y="30510483"/>
+            <a:ext cx="13898880" cy="1752599"/>
           </a:xfrm>
           <a:prstGeom prst="rect">
             <a:avLst/>
@@ -4258,7 +4292,7 @@
           <a:bodyPr vert="horz" lIns="101870" tIns="50935" rIns="101870" bIns="50935" rtlCol="0" anchor="ctr"/>
           <a:lstStyle>
             <a:lvl1pPr algn="ctr">
-              <a:defRPr sz="1300">
+              <a:defRPr sz="5506">
                 <a:solidFill>
                   <a:schemeClr val="tx1">
                     <a:tint val="75000"/>
@@ -4284,8 +4318,8 @@
         </p:nvSpPr>
         <p:spPr>
           <a:xfrm>
-            <a:off x="7208520" y="7203864"/>
-            <a:ext cx="2346960" cy="413808"/>
+            <a:off x="31455360" y="30510483"/>
+            <a:ext cx="10241280" cy="1752599"/>
           </a:xfrm>
           <a:prstGeom prst="rect">
             <a:avLst/>
@@ -4295,7 +4329,7 @@
           <a:bodyPr vert="horz" lIns="101870" tIns="50935" rIns="101870" bIns="50935" rtlCol="0" anchor="ctr"/>
           <a:lstStyle>
             <a:lvl1pPr algn="r">
-              <a:defRPr sz="1300">
+              <a:defRPr sz="5506">
                 <a:solidFill>
                   <a:schemeClr val="tx1">
                     <a:tint val="75000"/>
@@ -4332,12 +4366,12 @@
   </p:sldLayoutIdLst>
   <p:txStyles>
     <p:titleStyle>
-      <a:lvl1pPr algn="ctr" defTabSz="509352" rtl="0" eaLnBrk="1" latinLnBrk="0" hangingPunct="1">
+      <a:lvl1pPr algn="ctr" defTabSz="2157259" rtl="0" eaLnBrk="1" latinLnBrk="0" hangingPunct="1">
         <a:spcBef>
           <a:spcPct val="0"/>
         </a:spcBef>
         <a:buNone/>
-        <a:defRPr sz="4900" kern="1200">
+        <a:defRPr sz="20753" kern="1200">
           <a:solidFill>
             <a:schemeClr val="tx1"/>
           </a:solidFill>
@@ -4348,13 +4382,13 @@
       </a:lvl1pPr>
     </p:titleStyle>
     <p:bodyStyle>
-      <a:lvl1pPr marL="382015" indent="-382015" algn="l" defTabSz="509352" rtl="0" eaLnBrk="1" latinLnBrk="0" hangingPunct="1">
+      <a:lvl1pPr marL="1617948" indent="-1617948" algn="l" defTabSz="2157259" rtl="0" eaLnBrk="1" latinLnBrk="0" hangingPunct="1">
         <a:spcBef>
           <a:spcPct val="20000"/>
         </a:spcBef>
         <a:buFont typeface="Arial"/>
         <a:buChar char="•"/>
-        <a:defRPr sz="3600" kern="1200">
+        <a:defRPr sz="15247" kern="1200">
           <a:solidFill>
             <a:schemeClr val="tx1"/>
           </a:solidFill>
@@ -4363,13 +4397,13 @@
           <a:cs typeface="+mn-cs"/>
         </a:defRPr>
       </a:lvl1pPr>
-      <a:lvl2pPr marL="827698" indent="-318346" algn="l" defTabSz="509352" rtl="0" eaLnBrk="1" latinLnBrk="0" hangingPunct="1">
+      <a:lvl2pPr marL="3505549" indent="-1348291" algn="l" defTabSz="2157259" rtl="0" eaLnBrk="1" latinLnBrk="0" hangingPunct="1">
         <a:spcBef>
           <a:spcPct val="20000"/>
         </a:spcBef>
         <a:buFont typeface="Arial"/>
         <a:buChar char="–"/>
-        <a:defRPr sz="3100" kern="1200">
+        <a:defRPr sz="13129" kern="1200">
           <a:solidFill>
             <a:schemeClr val="tx1"/>
           </a:solidFill>
@@ -4378,13 +4412,13 @@
           <a:cs typeface="+mn-cs"/>
         </a:defRPr>
       </a:lvl2pPr>
-      <a:lvl3pPr marL="1273382" indent="-254676" algn="l" defTabSz="509352" rtl="0" eaLnBrk="1" latinLnBrk="0" hangingPunct="1">
+      <a:lvl3pPr marL="5393155" indent="-1078629" algn="l" defTabSz="2157259" rtl="0" eaLnBrk="1" latinLnBrk="0" hangingPunct="1">
         <a:spcBef>
           <a:spcPct val="20000"/>
         </a:spcBef>
         <a:buFont typeface="Arial"/>
         <a:buChar char="•"/>
-        <a:defRPr sz="2700" kern="1200">
+        <a:defRPr sz="11435" kern="1200">
           <a:solidFill>
             <a:schemeClr val="tx1"/>
           </a:solidFill>
@@ -4393,13 +4427,13 @@
           <a:cs typeface="+mn-cs"/>
         </a:defRPr>
       </a:lvl3pPr>
-      <a:lvl4pPr marL="1782734" indent="-254676" algn="l" defTabSz="509352" rtl="0" eaLnBrk="1" latinLnBrk="0" hangingPunct="1">
+      <a:lvl4pPr marL="7550413" indent="-1078629" algn="l" defTabSz="2157259" rtl="0" eaLnBrk="1" latinLnBrk="0" hangingPunct="1">
         <a:spcBef>
           <a:spcPct val="20000"/>
         </a:spcBef>
         <a:buFont typeface="Arial"/>
         <a:buChar char="–"/>
-        <a:defRPr sz="2200" kern="1200">
+        <a:defRPr sz="9318" kern="1200">
           <a:solidFill>
             <a:schemeClr val="tx1"/>
           </a:solidFill>
@@ -4408,13 +4442,13 @@
           <a:cs typeface="+mn-cs"/>
         </a:defRPr>
       </a:lvl4pPr>
-      <a:lvl5pPr marL="2292087" indent="-254676" algn="l" defTabSz="509352" rtl="0" eaLnBrk="1" latinLnBrk="0" hangingPunct="1">
+      <a:lvl5pPr marL="9707676" indent="-1078629" algn="l" defTabSz="2157259" rtl="0" eaLnBrk="1" latinLnBrk="0" hangingPunct="1">
         <a:spcBef>
           <a:spcPct val="20000"/>
         </a:spcBef>
         <a:buFont typeface="Arial"/>
         <a:buChar char="»"/>
-        <a:defRPr sz="2200" kern="1200">
+        <a:defRPr sz="9318" kern="1200">
           <a:solidFill>
             <a:schemeClr val="tx1"/>
           </a:solidFill>
@@ -4423,13 +4457,13 @@
           <a:cs typeface="+mn-cs"/>
         </a:defRPr>
       </a:lvl5pPr>
-      <a:lvl6pPr marL="2801440" indent="-254676" algn="l" defTabSz="509352" rtl="0" eaLnBrk="1" latinLnBrk="0" hangingPunct="1">
+      <a:lvl6pPr marL="11864939" indent="-1078629" algn="l" defTabSz="2157259" rtl="0" eaLnBrk="1" latinLnBrk="0" hangingPunct="1">
         <a:spcBef>
           <a:spcPct val="20000"/>
         </a:spcBef>
         <a:buFont typeface="Arial"/>
         <a:buChar char="•"/>
-        <a:defRPr sz="2200" kern="1200">
+        <a:defRPr sz="9318" kern="1200">
           <a:solidFill>
             <a:schemeClr val="tx1"/>
           </a:solidFill>
@@ -4438,13 +4472,13 @@
           <a:cs typeface="+mn-cs"/>
         </a:defRPr>
       </a:lvl6pPr>
-      <a:lvl7pPr marL="3310793" indent="-254676" algn="l" defTabSz="509352" rtl="0" eaLnBrk="1" latinLnBrk="0" hangingPunct="1">
+      <a:lvl7pPr marL="14022202" indent="-1078629" algn="l" defTabSz="2157259" rtl="0" eaLnBrk="1" latinLnBrk="0" hangingPunct="1">
         <a:spcBef>
           <a:spcPct val="20000"/>
         </a:spcBef>
         <a:buFont typeface="Arial"/>
         <a:buChar char="•"/>
-        <a:defRPr sz="2200" kern="1200">
+        <a:defRPr sz="9318" kern="1200">
           <a:solidFill>
             <a:schemeClr val="tx1"/>
           </a:solidFill>
@@ -4453,13 +4487,13 @@
           <a:cs typeface="+mn-cs"/>
         </a:defRPr>
       </a:lvl7pPr>
-      <a:lvl8pPr marL="3820145" indent="-254676" algn="l" defTabSz="509352" rtl="0" eaLnBrk="1" latinLnBrk="0" hangingPunct="1">
+      <a:lvl8pPr marL="16179460" indent="-1078629" algn="l" defTabSz="2157259" rtl="0" eaLnBrk="1" latinLnBrk="0" hangingPunct="1">
         <a:spcBef>
           <a:spcPct val="20000"/>
         </a:spcBef>
         <a:buFont typeface="Arial"/>
         <a:buChar char="•"/>
-        <a:defRPr sz="2200" kern="1200">
+        <a:defRPr sz="9318" kern="1200">
           <a:solidFill>
             <a:schemeClr val="tx1"/>
           </a:solidFill>
@@ -4468,13 +4502,13 @@
           <a:cs typeface="+mn-cs"/>
         </a:defRPr>
       </a:lvl8pPr>
-      <a:lvl9pPr marL="4329498" indent="-254676" algn="l" defTabSz="509352" rtl="0" eaLnBrk="1" latinLnBrk="0" hangingPunct="1">
+      <a:lvl9pPr marL="18336723" indent="-1078629" algn="l" defTabSz="2157259" rtl="0" eaLnBrk="1" latinLnBrk="0" hangingPunct="1">
         <a:spcBef>
           <a:spcPct val="20000"/>
         </a:spcBef>
         <a:buFont typeface="Arial"/>
         <a:buChar char="•"/>
-        <a:defRPr sz="2200" kern="1200">
+        <a:defRPr sz="9318" kern="1200">
           <a:solidFill>
             <a:schemeClr val="tx1"/>
           </a:solidFill>
@@ -4488,8 +4522,8 @@
       <a:defPPr>
         <a:defRPr lang="en-US"/>
       </a:defPPr>
-      <a:lvl1pPr marL="0" algn="l" defTabSz="509352" rtl="0" eaLnBrk="1" latinLnBrk="0" hangingPunct="1">
-        <a:defRPr sz="2000" kern="1200">
+      <a:lvl1pPr marL="0" algn="l" defTabSz="2157259" rtl="0" eaLnBrk="1" latinLnBrk="0" hangingPunct="1">
+        <a:defRPr sz="8471" kern="1200">
           <a:solidFill>
             <a:schemeClr val="tx1"/>
           </a:solidFill>
@@ -4498,8 +4532,8 @@
           <a:cs typeface="+mn-cs"/>
         </a:defRPr>
       </a:lvl1pPr>
-      <a:lvl2pPr marL="509352" algn="l" defTabSz="509352" rtl="0" eaLnBrk="1" latinLnBrk="0" hangingPunct="1">
-        <a:defRPr sz="2000" kern="1200">
+      <a:lvl2pPr marL="2157259" algn="l" defTabSz="2157259" rtl="0" eaLnBrk="1" latinLnBrk="0" hangingPunct="1">
+        <a:defRPr sz="8471" kern="1200">
           <a:solidFill>
             <a:schemeClr val="tx1"/>
           </a:solidFill>
@@ -4508,8 +4542,8 @@
           <a:cs typeface="+mn-cs"/>
         </a:defRPr>
       </a:lvl2pPr>
-      <a:lvl3pPr marL="1018705" algn="l" defTabSz="509352" rtl="0" eaLnBrk="1" latinLnBrk="0" hangingPunct="1">
-        <a:defRPr sz="2000" kern="1200">
+      <a:lvl3pPr marL="4314521" algn="l" defTabSz="2157259" rtl="0" eaLnBrk="1" latinLnBrk="0" hangingPunct="1">
+        <a:defRPr sz="8471" kern="1200">
           <a:solidFill>
             <a:schemeClr val="tx1"/>
           </a:solidFill>
@@ -4518,8 +4552,8 @@
           <a:cs typeface="+mn-cs"/>
         </a:defRPr>
       </a:lvl3pPr>
-      <a:lvl4pPr marL="1528058" algn="l" defTabSz="509352" rtl="0" eaLnBrk="1" latinLnBrk="0" hangingPunct="1">
-        <a:defRPr sz="2000" kern="1200">
+      <a:lvl4pPr marL="6471784" algn="l" defTabSz="2157259" rtl="0" eaLnBrk="1" latinLnBrk="0" hangingPunct="1">
+        <a:defRPr sz="8471" kern="1200">
           <a:solidFill>
             <a:schemeClr val="tx1"/>
           </a:solidFill>
@@ -4528,8 +4562,8 @@
           <a:cs typeface="+mn-cs"/>
         </a:defRPr>
       </a:lvl4pPr>
-      <a:lvl5pPr marL="2037411" algn="l" defTabSz="509352" rtl="0" eaLnBrk="1" latinLnBrk="0" hangingPunct="1">
-        <a:defRPr sz="2000" kern="1200">
+      <a:lvl5pPr marL="8629047" algn="l" defTabSz="2157259" rtl="0" eaLnBrk="1" latinLnBrk="0" hangingPunct="1">
+        <a:defRPr sz="8471" kern="1200">
           <a:solidFill>
             <a:schemeClr val="tx1"/>
           </a:solidFill>
@@ -4538,8 +4572,8 @@
           <a:cs typeface="+mn-cs"/>
         </a:defRPr>
       </a:lvl5pPr>
-      <a:lvl6pPr marL="2546764" algn="l" defTabSz="509352" rtl="0" eaLnBrk="1" latinLnBrk="0" hangingPunct="1">
-        <a:defRPr sz="2000" kern="1200">
+      <a:lvl6pPr marL="10786310" algn="l" defTabSz="2157259" rtl="0" eaLnBrk="1" latinLnBrk="0" hangingPunct="1">
+        <a:defRPr sz="8471" kern="1200">
           <a:solidFill>
             <a:schemeClr val="tx1"/>
           </a:solidFill>
@@ -4548,8 +4582,8 @@
           <a:cs typeface="+mn-cs"/>
         </a:defRPr>
       </a:lvl6pPr>
-      <a:lvl7pPr marL="3056116" algn="l" defTabSz="509352" rtl="0" eaLnBrk="1" latinLnBrk="0" hangingPunct="1">
-        <a:defRPr sz="2000" kern="1200">
+      <a:lvl7pPr marL="12943568" algn="l" defTabSz="2157259" rtl="0" eaLnBrk="1" latinLnBrk="0" hangingPunct="1">
+        <a:defRPr sz="8471" kern="1200">
           <a:solidFill>
             <a:schemeClr val="tx1"/>
           </a:solidFill>
@@ -4558,8 +4592,8 @@
           <a:cs typeface="+mn-cs"/>
         </a:defRPr>
       </a:lvl7pPr>
-      <a:lvl8pPr marL="3565469" algn="l" defTabSz="509352" rtl="0" eaLnBrk="1" latinLnBrk="0" hangingPunct="1">
-        <a:defRPr sz="2000" kern="1200">
+      <a:lvl8pPr marL="15100831" algn="l" defTabSz="2157259" rtl="0" eaLnBrk="1" latinLnBrk="0" hangingPunct="1">
+        <a:defRPr sz="8471" kern="1200">
           <a:solidFill>
             <a:schemeClr val="tx1"/>
           </a:solidFill>
@@ -4568,8 +4602,8 @@
           <a:cs typeface="+mn-cs"/>
         </a:defRPr>
       </a:lvl8pPr>
-      <a:lvl9pPr marL="4074821" algn="l" defTabSz="509352" rtl="0" eaLnBrk="1" latinLnBrk="0" hangingPunct="1">
-        <a:defRPr sz="2000" kern="1200">
+      <a:lvl9pPr marL="17258089" algn="l" defTabSz="2157259" rtl="0" eaLnBrk="1" latinLnBrk="0" hangingPunct="1">
+        <a:defRPr sz="8471" kern="1200">
           <a:solidFill>
             <a:schemeClr val="tx1"/>
           </a:solidFill>
@@ -4616,8 +4650,8 @@
         </p:blipFill>
         <p:spPr>
           <a:xfrm>
-            <a:off x="7429162" y="2551463"/>
-            <a:ext cx="2156959" cy="2708748"/>
+            <a:off x="32617750" y="10615832"/>
+            <a:ext cx="9465703" cy="11887200"/>
           </a:xfrm>
           <a:prstGeom prst="rect">
             <a:avLst/>
@@ -4640,8 +4674,8 @@
         </p:blipFill>
         <p:spPr>
           <a:xfrm>
-            <a:off x="3503691" y="2574926"/>
-            <a:ext cx="3582387" cy="2568972"/>
+            <a:off x="15847157" y="10679705"/>
+            <a:ext cx="16576495" cy="11887200"/>
           </a:xfrm>
           <a:prstGeom prst="rect">
             <a:avLst/>
@@ -4664,8 +4698,8 @@
         </p:blipFill>
         <p:spPr>
           <a:xfrm>
-            <a:off x="253893" y="1954443"/>
-            <a:ext cx="952554" cy="952554"/>
+            <a:off x="1720771" y="8277641"/>
+            <a:ext cx="4034346" cy="4034346"/>
           </a:xfrm>
           <a:prstGeom prst="rect">
             <a:avLst/>
@@ -4680,8 +4714,8 @@
         </p:nvSpPr>
         <p:spPr>
           <a:xfrm>
-            <a:off x="171450" y="1857830"/>
-            <a:ext cx="2343150" cy="2799896"/>
+            <a:off x="1371600" y="7868457"/>
+            <a:ext cx="13783158" cy="11858383"/>
           </a:xfrm>
           <a:prstGeom prst="rect">
             <a:avLst/>
@@ -4712,7 +4746,7 @@
           <a:lstStyle/>
           <a:p>
             <a:pPr algn="ctr"/>
-            <a:endParaRPr lang="en-US"/>
+            <a:endParaRPr lang="en-US" sz="36487"/>
           </a:p>
         </p:txBody>
       </p:sp>
@@ -4724,8 +4758,8 @@
         </p:nvSpPr>
         <p:spPr>
           <a:xfrm>
-            <a:off x="2973560" y="2451100"/>
-            <a:ext cx="6856239" cy="4489449"/>
+            <a:off x="15544799" y="10381132"/>
+            <a:ext cx="26928694" cy="19014137"/>
           </a:xfrm>
           <a:prstGeom prst="rect">
             <a:avLst/>
@@ -4733,7 +4767,7 @@
           <a:noFill/>
           <a:ln w="57150">
             <a:solidFill>
-              <a:schemeClr val="tx1"/>
+              <a:srgbClr val="FF0000"/>
             </a:solidFill>
           </a:ln>
         </p:spPr>
@@ -4756,7 +4790,7 @@
           <a:lstStyle/>
           <a:p>
             <a:pPr algn="ctr"/>
-            <a:endParaRPr lang="en-US"/>
+            <a:endParaRPr lang="en-US" sz="36487"/>
           </a:p>
         </p:txBody>
       </p:sp>
@@ -4768,8 +4802,8 @@
         </p:nvSpPr>
         <p:spPr>
           <a:xfrm>
-            <a:off x="171450" y="4853338"/>
-            <a:ext cx="2343150" cy="2623787"/>
+            <a:off x="1371599" y="20136024"/>
+            <a:ext cx="13783159" cy="11531802"/>
           </a:xfrm>
           <a:prstGeom prst="rect">
             <a:avLst/>
@@ -4800,7 +4834,7 @@
           <a:lstStyle/>
           <a:p>
             <a:pPr algn="ctr"/>
-            <a:endParaRPr lang="en-US"/>
+            <a:endParaRPr lang="en-US" sz="36487"/>
           </a:p>
         </p:txBody>
       </p:sp>
@@ -4820,8 +4854,8 @@
         </p:blipFill>
         <p:spPr>
           <a:xfrm>
-            <a:off x="3503691" y="5379529"/>
-            <a:ext cx="5037059" cy="1481208"/>
+            <a:off x="18275040" y="22780687"/>
+            <a:ext cx="21766831" cy="6400800"/>
           </a:xfrm>
           <a:prstGeom prst="rect">
             <a:avLst/>
@@ -4836,40 +4870,60 @@
         </p:nvSpPr>
         <p:spPr>
           <a:xfrm>
-            <a:off x="253893" y="4963886"/>
-            <a:ext cx="2140964" cy="1727200"/>
-          </a:xfrm>
-          <a:prstGeom prst="rect">
-            <a:avLst/>
-          </a:prstGeom>
-        </p:spPr>
-        <p:txBody>
-          <a:bodyPr vert="horz" wrap="square" lIns="101870" tIns="50935" rIns="101870" bIns="50935" rtlCol="0" anchor="t" anchorCtr="0">
+            <a:off x="1694571" y="20512768"/>
+            <a:ext cx="10911086" cy="2935061"/>
+          </a:xfrm>
+          <a:prstGeom prst="rect">
+            <a:avLst/>
+          </a:prstGeom>
+        </p:spPr>
+        <p:txBody>
+          <a:bodyPr vert="horz" wrap="square" lIns="431449" tIns="215725" rIns="431449" bIns="215725" rtlCol="0" anchor="t" anchorCtr="0">
             <a:noAutofit/>
           </a:bodyPr>
           <a:lstStyle/>
           <a:p>
             <a:r>
-              <a:rPr lang="en-US" dirty="0" smtClean="0"/>
+              <a:rPr lang="en-US" sz="5400" dirty="0"/>
               <a:t>About Binary</a:t>
             </a:r>
           </a:p>
           <a:p>
             <a:r>
-              <a:rPr lang="en-US" dirty="0" err="1"/>
-              <a:t>e</a:t>
+              <a:rPr lang="en-US" sz="5400" dirty="0" err="1" smtClean="0"/>
+              <a:t>Eg</a:t>
+            </a:r>
+            <a:endParaRPr lang="en-US" sz="5400" dirty="0" smtClean="0"/>
+          </a:p>
+          <a:p>
+            <a:endParaRPr lang="en-US" sz="5400" dirty="0"/>
+          </a:p>
+          <a:p>
+            <a:r>
+              <a:rPr lang="en-US" sz="5400" dirty="0" smtClean="0"/>
+              <a:t>Binary is a system of representing numbers as powers of two. A number consists a sequence of ones and zeros with each one or zero corresponding to a different power of two. These are 1,2,4,8,16,32…(doubling every time)</a:t>
+            </a:r>
+            <a:endParaRPr lang="en-US" sz="5400" dirty="0"/>
+          </a:p>
+          <a:p>
+            <a:r>
+              <a:rPr lang="en-US" sz="5400" dirty="0"/>
+              <a:t>010110 = </a:t>
             </a:r>
             <a:r>
-              <a:rPr lang="en-US" dirty="0" err="1" smtClean="0"/>
-              <a:t>g</a:t>
+              <a:rPr lang="en-US" sz="5400" dirty="0" smtClean="0"/>
+              <a:t>22</a:t>
             </a:r>
-            <a:endParaRPr lang="en-US" dirty="0" smtClean="0"/>
+          </a:p>
+          <a:p>
+            <a:endParaRPr lang="en-US" sz="5400" dirty="0"/>
           </a:p>
           <a:p>
             <a:r>
-              <a:rPr lang="en-US" dirty="0" smtClean="0"/>
-              <a:t>010110 = 22 </a:t>
+              <a:rPr lang="en-US" sz="5400" dirty="0" smtClean="0"/>
+              <a:t> </a:t>
             </a:r>
+            <a:endParaRPr lang="en-US" sz="5400" dirty="0"/>
           </a:p>
         </p:txBody>
       </p:sp>
@@ -4881,58 +4935,49 @@
         </p:nvSpPr>
         <p:spPr>
           <a:xfrm>
-            <a:off x="2973560" y="7068457"/>
-            <a:ext cx="6856239" cy="408668"/>
-          </a:xfrm>
-          <a:prstGeom prst="rect">
-            <a:avLst/>
-          </a:prstGeom>
-        </p:spPr>
-        <p:txBody>
-          <a:bodyPr vert="horz" wrap="square" lIns="101870" tIns="50935" rIns="101870" bIns="50935" rtlCol="0" anchor="t" anchorCtr="0">
+            <a:off x="15348857" y="29716893"/>
+            <a:ext cx="29038189" cy="1730829"/>
+          </a:xfrm>
+          <a:prstGeom prst="rect">
+            <a:avLst/>
+          </a:prstGeom>
+        </p:spPr>
+        <p:txBody>
+          <a:bodyPr vert="horz" wrap="square" lIns="431449" tIns="215725" rIns="431449" bIns="215725" rtlCol="0" anchor="t" anchorCtr="0">
             <a:noAutofit/>
           </a:bodyPr>
           <a:lstStyle/>
           <a:p>
             <a:r>
-              <a:rPr lang="en-US" sz="1200" dirty="0" smtClean="0"/>
+              <a:rPr lang="en-US" sz="5082" dirty="0"/>
               <a:t>Citations/Challenge Questions (</a:t>
             </a:r>
             <a:r>
-              <a:rPr lang="en-US" sz="1200" dirty="0" err="1" smtClean="0"/>
+              <a:rPr lang="en-US" sz="5082" dirty="0" err="1"/>
               <a:t>Numberphile</a:t>
             </a:r>
             <a:r>
-              <a:rPr lang="en-US" sz="1200" dirty="0" smtClean="0"/>
+              <a:rPr lang="en-US" sz="5082" dirty="0"/>
               <a:t>, Standup </a:t>
             </a:r>
             <a:r>
-              <a:rPr lang="en-US" sz="1200" dirty="0" err="1" smtClean="0"/>
+              <a:rPr lang="en-US" sz="5082" dirty="0" err="1"/>
               <a:t>Maths</a:t>
             </a:r>
             <a:r>
-              <a:rPr lang="en-US" sz="1200" dirty="0" smtClean="0"/>
+              <a:rPr lang="en-US" sz="5082" dirty="0"/>
               <a:t>, Wikipedia Turing</a:t>
             </a:r>
           </a:p>
           <a:p>
             <a:r>
-              <a:rPr lang="en-US" sz="1200" dirty="0" smtClean="0"/>
+              <a:rPr lang="en-US" sz="5082" dirty="0"/>
               <a:t>What two gates is the half adder a made of?  </a:t>
             </a:r>
             <a:r>
-              <a:rPr lang="en-US" sz="1200" dirty="0" smtClean="0"/>
-              <a:t>Why is </a:t>
+              <a:rPr lang="en-US" sz="5082" dirty="0"/>
+              <a:t>Why is one path long in the half adder?</a:t>
             </a:r>
-            <a:r>
-              <a:rPr lang="en-US" sz="1200" smtClean="0"/>
-              <a:t>one path </a:t>
-            </a:r>
-            <a:r>
-              <a:rPr lang="en-US" sz="1200" dirty="0" smtClean="0"/>
-              <a:t>long in the half adder?</a:t>
-            </a:r>
-            <a:endParaRPr lang="en-US" sz="1200" dirty="0" smtClean="0"/>
           </a:p>
         </p:txBody>
       </p:sp>
@@ -4944,79 +4989,110 @@
         </p:nvSpPr>
         <p:spPr>
           <a:xfrm>
-            <a:off x="171450" y="2906996"/>
-            <a:ext cx="2343150" cy="1750729"/>
-          </a:xfrm>
-          <a:prstGeom prst="rect">
-            <a:avLst/>
-          </a:prstGeom>
-        </p:spPr>
-        <p:txBody>
-          <a:bodyPr vert="horz" wrap="square" lIns="101870" tIns="50935" rIns="101870" bIns="50935" rtlCol="0" anchor="t" anchorCtr="0">
+            <a:off x="1371600" y="12311985"/>
+            <a:ext cx="13783158" cy="4494930"/>
+          </a:xfrm>
+          <a:prstGeom prst="rect">
+            <a:avLst/>
+          </a:prstGeom>
+        </p:spPr>
+        <p:txBody>
+          <a:bodyPr vert="horz" wrap="square" lIns="431449" tIns="215725" rIns="431449" bIns="215725" rtlCol="0" anchor="t" anchorCtr="0">
             <a:noAutofit/>
           </a:bodyPr>
           <a:lstStyle/>
           <a:p>
             <a:r>
-              <a:rPr lang="en-US" dirty="0" smtClean="0"/>
-              <a:t>Alan Turing.  First computer had no electronics.  Go Allies beat Nazis.</a:t>
+              <a:rPr lang="en-US" sz="8800" dirty="0" smtClean="0"/>
+              <a:t>Alan Turing came up with the idea of the computer</a:t>
             </a:r>
-          </a:p>
-        </p:txBody>
-      </p:sp>
-      <p:sp>
-        <p:nvSpPr>
-          <p:cNvPr id="15" name="TextBox 14"/>
+            <a:endParaRPr lang="en-US" sz="8000" dirty="0" smtClean="0"/>
+          </a:p>
+        </p:txBody>
+      </p:sp>
+      <p:sp>
+        <p:nvSpPr>
+          <p:cNvPr id="16" name="TextBox 15"/>
           <p:cNvSpPr txBox="1"/>
           <p:nvPr/>
         </p:nvSpPr>
         <p:spPr>
           <a:xfrm>
-            <a:off x="4079393" y="145057"/>
-            <a:ext cx="2322286" cy="725800"/>
-          </a:xfrm>
-          <a:prstGeom prst="rect">
-            <a:avLst/>
-          </a:prstGeom>
-        </p:spPr>
-        <p:txBody>
-          <a:bodyPr vert="horz" wrap="square" lIns="101870" tIns="50935" rIns="101870" bIns="50935" rtlCol="0" anchor="t" anchorCtr="0">
+            <a:off x="15348857" y="7541856"/>
+            <a:ext cx="28006141" cy="3073976"/>
+          </a:xfrm>
+          <a:prstGeom prst="rect">
+            <a:avLst/>
+          </a:prstGeom>
+        </p:spPr>
+        <p:txBody>
+          <a:bodyPr vert="horz" wrap="square" lIns="431449" tIns="215725" rIns="431449" bIns="215725" rtlCol="0" anchor="t" anchorCtr="0">
             <a:noAutofit/>
           </a:bodyPr>
           <a:lstStyle/>
           <a:p>
             <a:r>
-              <a:rPr lang="en-US" dirty="0" smtClean="0"/>
-              <a:t>This “Title” appears to be stuck here.</a:t>
+              <a:rPr lang="en-US" sz="7200" dirty="0" smtClean="0"/>
+              <a:t>HEADER</a:t>
             </a:r>
           </a:p>
-        </p:txBody>
-      </p:sp>
-      <p:sp>
-        <p:nvSpPr>
-          <p:cNvPr id="16" name="TextBox 15"/>
-          <p:cNvSpPr txBox="1"/>
+          <a:p>
+            <a:r>
+              <a:rPr lang="en-US" sz="7200" dirty="0" smtClean="0"/>
+              <a:t>Logic </a:t>
+            </a:r>
+            <a:r>
+              <a:rPr lang="en-US" sz="7200" dirty="0"/>
+              <a:t>Gates.  </a:t>
+            </a:r>
+            <a:r>
+              <a:rPr lang="en-US" sz="7200" dirty="0"/>
+              <a:t>Boolean 1 = True, 0 = False  </a:t>
+            </a:r>
+          </a:p>
+        </p:txBody>
+      </p:sp>
+      <p:sp>
+        <p:nvSpPr>
+          <p:cNvPr id="15" name="Rectangle 14"/>
+          <p:cNvSpPr/>
           <p:nvPr/>
         </p:nvSpPr>
         <p:spPr>
           <a:xfrm>
-            <a:off x="2973559" y="1613495"/>
-            <a:ext cx="6612561" cy="725800"/>
-          </a:xfrm>
-          <a:prstGeom prst="rect">
-            <a:avLst/>
-          </a:prstGeom>
-        </p:spPr>
-        <p:txBody>
-          <a:bodyPr vert="horz" wrap="square" lIns="101870" tIns="50935" rIns="101870" bIns="50935" rtlCol="0" anchor="t" anchorCtr="0">
-            <a:noAutofit/>
-          </a:bodyPr>
+            <a:off x="15568769" y="7868455"/>
+            <a:ext cx="26904724" cy="2191054"/>
+          </a:xfrm>
+          <a:prstGeom prst="rect">
+            <a:avLst/>
+          </a:prstGeom>
+          <a:noFill/>
+          <a:ln w="57150">
+            <a:solidFill>
+              <a:schemeClr val="tx1"/>
+            </a:solidFill>
+          </a:ln>
+        </p:spPr>
+        <p:style>
+          <a:lnRef idx="1">
+            <a:schemeClr val="accent1"/>
+          </a:lnRef>
+          <a:fillRef idx="3">
+            <a:schemeClr val="accent1"/>
+          </a:fillRef>
+          <a:effectRef idx="2">
+            <a:schemeClr val="accent1"/>
+          </a:effectRef>
+          <a:fontRef idx="minor">
+            <a:schemeClr val="lt1"/>
+          </a:fontRef>
+        </p:style>
+        <p:txBody>
+          <a:bodyPr rtlCol="0" anchor="ctr"/>
           <a:lstStyle/>
           <a:p>
-            <a:r>
-              <a:rPr lang="en-US" dirty="0" smtClean="0"/>
-              <a:t>Logic Gates.  Boolean 1 = True, 0 = False  </a:t>
-            </a:r>
+            <a:pPr algn="ctr"/>
+            <a:endParaRPr lang="en-US" sz="36487"/>
           </a:p>
         </p:txBody>
       </p:sp>
@@ -5030,6 +5106,13 @@
   <p:clrMapOvr>
     <a:masterClrMapping/>
   </p:clrMapOvr>
+  <p:timing>
+    <p:tnLst>
+      <p:par>
+        <p:cTn id="1" dur="indefinite" restart="never" nodeType="tmRoot"/>
+      </p:par>
+    </p:tnLst>
+  </p:timing>
 </p:sld>
 </file>
 

</xml_diff>